<commit_message>
Update Course Class and objects / FISE and FISA
</commit_message>
<xml_diff>
--- a/ONIP-FISA/POO_eclairement/ONIP2_Classes_et_objets.pptx
+++ b/ONIP-FISA/POO_eclairement/ONIP2_Classes_et_objets.pptx
@@ -5,7 +5,7 @@
     <p:sldMasterId id="2147483711" r:id="rId1"/>
   </p:sldMasterIdLst>
   <p:notesMasterIdLst>
-    <p:notesMasterId r:id="rId37"/>
+    <p:notesMasterId r:id="rId38"/>
   </p:notesMasterIdLst>
   <p:sldIdLst>
     <p:sldId id="256" r:id="rId2"/>
@@ -27,22 +27,23 @@
     <p:sldId id="347" r:id="rId18"/>
     <p:sldId id="348" r:id="rId19"/>
     <p:sldId id="349" r:id="rId20"/>
-    <p:sldId id="351" r:id="rId21"/>
-    <p:sldId id="352" r:id="rId22"/>
-    <p:sldId id="350" r:id="rId23"/>
-    <p:sldId id="336" r:id="rId24"/>
-    <p:sldId id="337" r:id="rId25"/>
-    <p:sldId id="338" r:id="rId26"/>
-    <p:sldId id="342" r:id="rId27"/>
-    <p:sldId id="354" r:id="rId28"/>
-    <p:sldId id="355" r:id="rId29"/>
-    <p:sldId id="356" r:id="rId30"/>
-    <p:sldId id="357" r:id="rId31"/>
-    <p:sldId id="358" r:id="rId32"/>
-    <p:sldId id="359" r:id="rId33"/>
-    <p:sldId id="360" r:id="rId34"/>
-    <p:sldId id="340" r:id="rId35"/>
-    <p:sldId id="345" r:id="rId36"/>
+    <p:sldId id="361" r:id="rId21"/>
+    <p:sldId id="351" r:id="rId22"/>
+    <p:sldId id="352" r:id="rId23"/>
+    <p:sldId id="350" r:id="rId24"/>
+    <p:sldId id="336" r:id="rId25"/>
+    <p:sldId id="337" r:id="rId26"/>
+    <p:sldId id="338" r:id="rId27"/>
+    <p:sldId id="342" r:id="rId28"/>
+    <p:sldId id="354" r:id="rId29"/>
+    <p:sldId id="355" r:id="rId30"/>
+    <p:sldId id="356" r:id="rId31"/>
+    <p:sldId id="357" r:id="rId32"/>
+    <p:sldId id="358" r:id="rId33"/>
+    <p:sldId id="359" r:id="rId34"/>
+    <p:sldId id="360" r:id="rId35"/>
+    <p:sldId id="340" r:id="rId36"/>
+    <p:sldId id="345" r:id="rId37"/>
   </p:sldIdLst>
   <p:sldSz cx="12192000" cy="6858000"/>
   <p:notesSz cx="6858000" cy="9144000"/>
@@ -1405,6 +1406,117 @@
         <p:cNvPr id="1" name="">
           <a:extLst>
             <a:ext uri="{FF2B5EF4-FFF2-40B4-BE49-F238E27FC236}">
+              <a16:creationId xmlns:a16="http://schemas.microsoft.com/office/drawing/2014/main" id="{79F3A34D-1770-A6C6-24AE-157F3F637F92}"/>
+            </a:ext>
+          </a:extLst>
+        </p:cNvPr>
+        <p:cNvGrpSpPr/>
+        <p:nvPr/>
+      </p:nvGrpSpPr>
+      <p:grpSpPr>
+        <a:xfrm>
+          <a:off x="0" y="0"/>
+          <a:ext cx="0" cy="0"/>
+          <a:chOff x="0" y="0"/>
+          <a:chExt cx="0" cy="0"/>
+        </a:xfrm>
+      </p:grpSpPr>
+      <p:sp>
+        <p:nvSpPr>
+          <p:cNvPr id="2" name="Espace réservé de l'image des diapositives 1">
+            <a:extLst>
+              <a:ext uri="{FF2B5EF4-FFF2-40B4-BE49-F238E27FC236}">
+                <a16:creationId xmlns:a16="http://schemas.microsoft.com/office/drawing/2014/main" id="{97F6B586-7F42-2BC0-92AD-4F6F15E6CFC1}"/>
+              </a:ext>
+            </a:extLst>
+          </p:cNvPr>
+          <p:cNvSpPr>
+            <a:spLocks noGrp="1" noRot="1" noChangeAspect="1"/>
+          </p:cNvSpPr>
+          <p:nvPr>
+            <p:ph type="sldImg"/>
+          </p:nvPr>
+        </p:nvSpPr>
+        <p:spPr/>
+      </p:sp>
+      <p:sp>
+        <p:nvSpPr>
+          <p:cNvPr id="3" name="Espace réservé des notes 2">
+            <a:extLst>
+              <a:ext uri="{FF2B5EF4-FFF2-40B4-BE49-F238E27FC236}">
+                <a16:creationId xmlns:a16="http://schemas.microsoft.com/office/drawing/2014/main" id="{FF46FC9D-9029-0713-26A5-D2B93DA800D4}"/>
+              </a:ext>
+            </a:extLst>
+          </p:cNvPr>
+          <p:cNvSpPr>
+            <a:spLocks noGrp="1"/>
+          </p:cNvSpPr>
+          <p:nvPr>
+            <p:ph type="body" idx="1"/>
+          </p:nvPr>
+        </p:nvSpPr>
+        <p:spPr/>
+        <p:txBody>
+          <a:bodyPr/>
+          <a:lstStyle/>
+          <a:p>
+            <a:endParaRPr lang="fr-FR" dirty="0"/>
+          </a:p>
+          <a:p>
+            <a:endParaRPr lang="fr-FR" dirty="0"/>
+          </a:p>
+        </p:txBody>
+      </p:sp>
+      <p:sp>
+        <p:nvSpPr>
+          <p:cNvPr id="4" name="Espace réservé du numéro de diapositive 3">
+            <a:extLst>
+              <a:ext uri="{FF2B5EF4-FFF2-40B4-BE49-F238E27FC236}">
+                <a16:creationId xmlns:a16="http://schemas.microsoft.com/office/drawing/2014/main" id="{5E7EB53D-0550-BFB6-4DF3-C2288381E9FC}"/>
+              </a:ext>
+            </a:extLst>
+          </p:cNvPr>
+          <p:cNvSpPr>
+            <a:spLocks noGrp="1"/>
+          </p:cNvSpPr>
+          <p:nvPr>
+            <p:ph type="sldNum" sz="quarter" idx="5"/>
+          </p:nvPr>
+        </p:nvSpPr>
+        <p:spPr/>
+        <p:txBody>
+          <a:bodyPr/>
+          <a:lstStyle/>
+          <a:p>
+            <a:fld id="{6BDC53D4-8BF5-4FDD-81EC-7AC957B0D210}" type="slidenum">
+              <a:rPr lang="fr-FR" smtClean="0"/>
+              <a:t>20</a:t>
+            </a:fld>
+            <a:endParaRPr lang="fr-FR"/>
+          </a:p>
+        </p:txBody>
+      </p:sp>
+    </p:spTree>
+    <p:extLst>
+      <p:ext uri="{BB962C8B-B14F-4D97-AF65-F5344CB8AC3E}">
+        <p14:creationId xmlns:p14="http://schemas.microsoft.com/office/powerpoint/2010/main" val="95430346"/>
+      </p:ext>
+    </p:extLst>
+  </p:cSld>
+  <p:clrMapOvr>
+    <a:masterClrMapping/>
+  </p:clrMapOvr>
+</p:notes>
+</file>
+
+<file path=ppt/notesSlides/notesSlide18.xml><?xml version="1.0" encoding="utf-8"?>
+<p:notes xmlns:a="http://schemas.openxmlformats.org/drawingml/2006/main" xmlns:r="http://schemas.openxmlformats.org/officeDocument/2006/relationships" xmlns:p="http://schemas.openxmlformats.org/presentationml/2006/main">
+  <p:cSld>
+    <p:spTree>
+      <p:nvGrpSpPr>
+        <p:cNvPr id="1" name="">
+          <a:extLst>
+            <a:ext uri="{FF2B5EF4-FFF2-40B4-BE49-F238E27FC236}">
               <a16:creationId xmlns:a16="http://schemas.microsoft.com/office/drawing/2014/main" id="{EEC8839A-DCBD-0A8A-6650-AB81ED3DA763}"/>
             </a:ext>
           </a:extLst>
@@ -1489,7 +1601,7 @@
           <a:p>
             <a:fld id="{6BDC53D4-8BF5-4FDD-81EC-7AC957B0D210}" type="slidenum">
               <a:rPr lang="fr-FR" smtClean="0"/>
-              <a:t>20</a:t>
+              <a:t>21</a:t>
             </a:fld>
             <a:endParaRPr lang="fr-FR"/>
           </a:p>
@@ -1508,7 +1620,7 @@
 </p:notes>
 </file>
 
-<file path=ppt/notesSlides/notesSlide18.xml><?xml version="1.0" encoding="utf-8"?>
+<file path=ppt/notesSlides/notesSlide19.xml><?xml version="1.0" encoding="utf-8"?>
 <p:notes xmlns:a="http://schemas.openxmlformats.org/drawingml/2006/main" xmlns:r="http://schemas.openxmlformats.org/officeDocument/2006/relationships" xmlns:p="http://schemas.openxmlformats.org/presentationml/2006/main">
   <p:cSld>
     <p:spTree>
@@ -1600,7 +1712,7 @@
           <a:p>
             <a:fld id="{6BDC53D4-8BF5-4FDD-81EC-7AC957B0D210}" type="slidenum">
               <a:rPr lang="fr-FR" smtClean="0"/>
-              <a:t>21</a:t>
+              <a:t>22</a:t>
             </a:fld>
             <a:endParaRPr lang="fr-FR"/>
           </a:p>
@@ -1610,117 +1722,6 @@
     <p:extLst>
       <p:ext uri="{BB962C8B-B14F-4D97-AF65-F5344CB8AC3E}">
         <p14:creationId xmlns:p14="http://schemas.microsoft.com/office/powerpoint/2010/main" val="3382207936"/>
-      </p:ext>
-    </p:extLst>
-  </p:cSld>
-  <p:clrMapOvr>
-    <a:masterClrMapping/>
-  </p:clrMapOvr>
-</p:notes>
-</file>
-
-<file path=ppt/notesSlides/notesSlide19.xml><?xml version="1.0" encoding="utf-8"?>
-<p:notes xmlns:a="http://schemas.openxmlformats.org/drawingml/2006/main" xmlns:r="http://schemas.openxmlformats.org/officeDocument/2006/relationships" xmlns:p="http://schemas.openxmlformats.org/presentationml/2006/main">
-  <p:cSld>
-    <p:spTree>
-      <p:nvGrpSpPr>
-        <p:cNvPr id="1" name="">
-          <a:extLst>
-            <a:ext uri="{FF2B5EF4-FFF2-40B4-BE49-F238E27FC236}">
-              <a16:creationId xmlns:a16="http://schemas.microsoft.com/office/drawing/2014/main" id="{A8937E42-57D1-334D-B72D-BAEC6A02B265}"/>
-            </a:ext>
-          </a:extLst>
-        </p:cNvPr>
-        <p:cNvGrpSpPr/>
-        <p:nvPr/>
-      </p:nvGrpSpPr>
-      <p:grpSpPr>
-        <a:xfrm>
-          <a:off x="0" y="0"/>
-          <a:ext cx="0" cy="0"/>
-          <a:chOff x="0" y="0"/>
-          <a:chExt cx="0" cy="0"/>
-        </a:xfrm>
-      </p:grpSpPr>
-      <p:sp>
-        <p:nvSpPr>
-          <p:cNvPr id="2" name="Espace réservé de l'image des diapositives 1">
-            <a:extLst>
-              <a:ext uri="{FF2B5EF4-FFF2-40B4-BE49-F238E27FC236}">
-                <a16:creationId xmlns:a16="http://schemas.microsoft.com/office/drawing/2014/main" id="{C4E2FB7F-E2BD-DACC-A8D8-7EB16310F349}"/>
-              </a:ext>
-            </a:extLst>
-          </p:cNvPr>
-          <p:cNvSpPr>
-            <a:spLocks noGrp="1" noRot="1" noChangeAspect="1"/>
-          </p:cNvSpPr>
-          <p:nvPr>
-            <p:ph type="sldImg"/>
-          </p:nvPr>
-        </p:nvSpPr>
-        <p:spPr/>
-      </p:sp>
-      <p:sp>
-        <p:nvSpPr>
-          <p:cNvPr id="3" name="Espace réservé des notes 2">
-            <a:extLst>
-              <a:ext uri="{FF2B5EF4-FFF2-40B4-BE49-F238E27FC236}">
-                <a16:creationId xmlns:a16="http://schemas.microsoft.com/office/drawing/2014/main" id="{AECE56C9-DC13-2BD9-DF6C-4BC0C38F76C8}"/>
-              </a:ext>
-            </a:extLst>
-          </p:cNvPr>
-          <p:cNvSpPr>
-            <a:spLocks noGrp="1"/>
-          </p:cNvSpPr>
-          <p:nvPr>
-            <p:ph type="body" idx="1"/>
-          </p:nvPr>
-        </p:nvSpPr>
-        <p:spPr/>
-        <p:txBody>
-          <a:bodyPr/>
-          <a:lstStyle/>
-          <a:p>
-            <a:endParaRPr lang="fr-FR" dirty="0"/>
-          </a:p>
-          <a:p>
-            <a:endParaRPr lang="fr-FR" dirty="0"/>
-          </a:p>
-        </p:txBody>
-      </p:sp>
-      <p:sp>
-        <p:nvSpPr>
-          <p:cNvPr id="4" name="Espace réservé du numéro de diapositive 3">
-            <a:extLst>
-              <a:ext uri="{FF2B5EF4-FFF2-40B4-BE49-F238E27FC236}">
-                <a16:creationId xmlns:a16="http://schemas.microsoft.com/office/drawing/2014/main" id="{21408B11-2030-211B-DD93-6E064B87C5DD}"/>
-              </a:ext>
-            </a:extLst>
-          </p:cNvPr>
-          <p:cNvSpPr>
-            <a:spLocks noGrp="1"/>
-          </p:cNvSpPr>
-          <p:nvPr>
-            <p:ph type="sldNum" sz="quarter" idx="5"/>
-          </p:nvPr>
-        </p:nvSpPr>
-        <p:spPr/>
-        <p:txBody>
-          <a:bodyPr/>
-          <a:lstStyle/>
-          <a:p>
-            <a:fld id="{6BDC53D4-8BF5-4FDD-81EC-7AC957B0D210}" type="slidenum">
-              <a:rPr lang="fr-FR" smtClean="0"/>
-              <a:t>22</a:t>
-            </a:fld>
-            <a:endParaRPr lang="fr-FR"/>
-          </a:p>
-        </p:txBody>
-      </p:sp>
-    </p:spTree>
-    <p:extLst>
-      <p:ext uri="{BB962C8B-B14F-4D97-AF65-F5344CB8AC3E}">
-        <p14:creationId xmlns:p14="http://schemas.microsoft.com/office/powerpoint/2010/main" val="1386188702"/>
       </p:ext>
     </p:extLst>
   </p:cSld>
@@ -1849,6 +1850,117 @@
         <p:cNvPr id="1" name="">
           <a:extLst>
             <a:ext uri="{FF2B5EF4-FFF2-40B4-BE49-F238E27FC236}">
+              <a16:creationId xmlns:a16="http://schemas.microsoft.com/office/drawing/2014/main" id="{A8937E42-57D1-334D-B72D-BAEC6A02B265}"/>
+            </a:ext>
+          </a:extLst>
+        </p:cNvPr>
+        <p:cNvGrpSpPr/>
+        <p:nvPr/>
+      </p:nvGrpSpPr>
+      <p:grpSpPr>
+        <a:xfrm>
+          <a:off x="0" y="0"/>
+          <a:ext cx="0" cy="0"/>
+          <a:chOff x="0" y="0"/>
+          <a:chExt cx="0" cy="0"/>
+        </a:xfrm>
+      </p:grpSpPr>
+      <p:sp>
+        <p:nvSpPr>
+          <p:cNvPr id="2" name="Espace réservé de l'image des diapositives 1">
+            <a:extLst>
+              <a:ext uri="{FF2B5EF4-FFF2-40B4-BE49-F238E27FC236}">
+                <a16:creationId xmlns:a16="http://schemas.microsoft.com/office/drawing/2014/main" id="{C4E2FB7F-E2BD-DACC-A8D8-7EB16310F349}"/>
+              </a:ext>
+            </a:extLst>
+          </p:cNvPr>
+          <p:cNvSpPr>
+            <a:spLocks noGrp="1" noRot="1" noChangeAspect="1"/>
+          </p:cNvSpPr>
+          <p:nvPr>
+            <p:ph type="sldImg"/>
+          </p:nvPr>
+        </p:nvSpPr>
+        <p:spPr/>
+      </p:sp>
+      <p:sp>
+        <p:nvSpPr>
+          <p:cNvPr id="3" name="Espace réservé des notes 2">
+            <a:extLst>
+              <a:ext uri="{FF2B5EF4-FFF2-40B4-BE49-F238E27FC236}">
+                <a16:creationId xmlns:a16="http://schemas.microsoft.com/office/drawing/2014/main" id="{AECE56C9-DC13-2BD9-DF6C-4BC0C38F76C8}"/>
+              </a:ext>
+            </a:extLst>
+          </p:cNvPr>
+          <p:cNvSpPr>
+            <a:spLocks noGrp="1"/>
+          </p:cNvSpPr>
+          <p:nvPr>
+            <p:ph type="body" idx="1"/>
+          </p:nvPr>
+        </p:nvSpPr>
+        <p:spPr/>
+        <p:txBody>
+          <a:bodyPr/>
+          <a:lstStyle/>
+          <a:p>
+            <a:endParaRPr lang="fr-FR" dirty="0"/>
+          </a:p>
+          <a:p>
+            <a:endParaRPr lang="fr-FR" dirty="0"/>
+          </a:p>
+        </p:txBody>
+      </p:sp>
+      <p:sp>
+        <p:nvSpPr>
+          <p:cNvPr id="4" name="Espace réservé du numéro de diapositive 3">
+            <a:extLst>
+              <a:ext uri="{FF2B5EF4-FFF2-40B4-BE49-F238E27FC236}">
+                <a16:creationId xmlns:a16="http://schemas.microsoft.com/office/drawing/2014/main" id="{21408B11-2030-211B-DD93-6E064B87C5DD}"/>
+              </a:ext>
+            </a:extLst>
+          </p:cNvPr>
+          <p:cNvSpPr>
+            <a:spLocks noGrp="1"/>
+          </p:cNvSpPr>
+          <p:nvPr>
+            <p:ph type="sldNum" sz="quarter" idx="5"/>
+          </p:nvPr>
+        </p:nvSpPr>
+        <p:spPr/>
+        <p:txBody>
+          <a:bodyPr/>
+          <a:lstStyle/>
+          <a:p>
+            <a:fld id="{6BDC53D4-8BF5-4FDD-81EC-7AC957B0D210}" type="slidenum">
+              <a:rPr lang="fr-FR" smtClean="0"/>
+              <a:t>23</a:t>
+            </a:fld>
+            <a:endParaRPr lang="fr-FR"/>
+          </a:p>
+        </p:txBody>
+      </p:sp>
+    </p:spTree>
+    <p:extLst>
+      <p:ext uri="{BB962C8B-B14F-4D97-AF65-F5344CB8AC3E}">
+        <p14:creationId xmlns:p14="http://schemas.microsoft.com/office/powerpoint/2010/main" val="1386188702"/>
+      </p:ext>
+    </p:extLst>
+  </p:cSld>
+  <p:clrMapOvr>
+    <a:masterClrMapping/>
+  </p:clrMapOvr>
+</p:notes>
+</file>
+
+<file path=ppt/notesSlides/notesSlide21.xml><?xml version="1.0" encoding="utf-8"?>
+<p:notes xmlns:a="http://schemas.openxmlformats.org/drawingml/2006/main" xmlns:r="http://schemas.openxmlformats.org/officeDocument/2006/relationships" xmlns:p="http://schemas.openxmlformats.org/presentationml/2006/main">
+  <p:cSld>
+    <p:spTree>
+      <p:nvGrpSpPr>
+        <p:cNvPr id="1" name="">
+          <a:extLst>
+            <a:ext uri="{FF2B5EF4-FFF2-40B4-BE49-F238E27FC236}">
               <a16:creationId xmlns:a16="http://schemas.microsoft.com/office/drawing/2014/main" id="{91CF4C5E-3994-348A-5A0E-A32F4C0F94D0}"/>
             </a:ext>
           </a:extLst>
@@ -1933,7 +2045,7 @@
           <a:p>
             <a:fld id="{6BDC53D4-8BF5-4FDD-81EC-7AC957B0D210}" type="slidenum">
               <a:rPr lang="fr-FR" smtClean="0"/>
-              <a:t>23</a:t>
+              <a:t>24</a:t>
             </a:fld>
             <a:endParaRPr lang="fr-FR"/>
           </a:p>
@@ -1952,7 +2064,7 @@
 </p:notes>
 </file>
 
-<file path=ppt/notesSlides/notesSlide21.xml><?xml version="1.0" encoding="utf-8"?>
+<file path=ppt/notesSlides/notesSlide22.xml><?xml version="1.0" encoding="utf-8"?>
 <p:notes xmlns:a="http://schemas.openxmlformats.org/drawingml/2006/main" xmlns:r="http://schemas.openxmlformats.org/officeDocument/2006/relationships" xmlns:p="http://schemas.openxmlformats.org/presentationml/2006/main">
   <p:cSld>
     <p:spTree>
@@ -2044,7 +2156,7 @@
           <a:p>
             <a:fld id="{6BDC53D4-8BF5-4FDD-81EC-7AC957B0D210}" type="slidenum">
               <a:rPr lang="fr-FR" smtClean="0"/>
-              <a:t>25</a:t>
+              <a:t>26</a:t>
             </a:fld>
             <a:endParaRPr lang="fr-FR"/>
           </a:p>
@@ -2063,7 +2175,7 @@
 </p:notes>
 </file>
 
-<file path=ppt/notesSlides/notesSlide22.xml><?xml version="1.0" encoding="utf-8"?>
+<file path=ppt/notesSlides/notesSlide23.xml><?xml version="1.0" encoding="utf-8"?>
 <p:notes xmlns:a="http://schemas.openxmlformats.org/drawingml/2006/main" xmlns:r="http://schemas.openxmlformats.org/officeDocument/2006/relationships" xmlns:p="http://schemas.openxmlformats.org/presentationml/2006/main">
   <p:cSld>
     <p:spTree>
@@ -2155,7 +2267,7 @@
           <a:p>
             <a:fld id="{6BDC53D4-8BF5-4FDD-81EC-7AC957B0D210}" type="slidenum">
               <a:rPr lang="fr-FR" smtClean="0"/>
-              <a:t>26</a:t>
+              <a:t>27</a:t>
             </a:fld>
             <a:endParaRPr lang="fr-FR"/>
           </a:p>
@@ -2174,7 +2286,7 @@
 </p:notes>
 </file>
 
-<file path=ppt/notesSlides/notesSlide23.xml><?xml version="1.0" encoding="utf-8"?>
+<file path=ppt/notesSlides/notesSlide24.xml><?xml version="1.0" encoding="utf-8"?>
 <p:notes xmlns:a="http://schemas.openxmlformats.org/drawingml/2006/main" xmlns:r="http://schemas.openxmlformats.org/officeDocument/2006/relationships" xmlns:p="http://schemas.openxmlformats.org/presentationml/2006/main">
   <p:cSld>
     <p:spTree>
@@ -2266,7 +2378,7 @@
           <a:p>
             <a:fld id="{6BDC53D4-8BF5-4FDD-81EC-7AC957B0D210}" type="slidenum">
               <a:rPr lang="fr-FR" smtClean="0"/>
-              <a:t>27</a:t>
+              <a:t>28</a:t>
             </a:fld>
             <a:endParaRPr lang="fr-FR"/>
           </a:p>
@@ -2285,7 +2397,7 @@
 </p:notes>
 </file>
 
-<file path=ppt/notesSlides/notesSlide24.xml><?xml version="1.0" encoding="utf-8"?>
+<file path=ppt/notesSlides/notesSlide25.xml><?xml version="1.0" encoding="utf-8"?>
 <p:notes xmlns:a="http://schemas.openxmlformats.org/drawingml/2006/main" xmlns:r="http://schemas.openxmlformats.org/officeDocument/2006/relationships" xmlns:p="http://schemas.openxmlformats.org/presentationml/2006/main">
   <p:cSld>
     <p:spTree>
@@ -2377,7 +2489,7 @@
           <a:p>
             <a:fld id="{6BDC53D4-8BF5-4FDD-81EC-7AC957B0D210}" type="slidenum">
               <a:rPr lang="fr-FR" smtClean="0"/>
-              <a:t>28</a:t>
+              <a:t>29</a:t>
             </a:fld>
             <a:endParaRPr lang="fr-FR"/>
           </a:p>
@@ -2396,7 +2508,7 @@
 </p:notes>
 </file>
 
-<file path=ppt/notesSlides/notesSlide25.xml><?xml version="1.0" encoding="utf-8"?>
+<file path=ppt/notesSlides/notesSlide26.xml><?xml version="1.0" encoding="utf-8"?>
 <p:notes xmlns:a="http://schemas.openxmlformats.org/drawingml/2006/main" xmlns:r="http://schemas.openxmlformats.org/officeDocument/2006/relationships" xmlns:p="http://schemas.openxmlformats.org/presentationml/2006/main">
   <p:cSld>
     <p:spTree>
@@ -2488,7 +2600,7 @@
           <a:p>
             <a:fld id="{6BDC53D4-8BF5-4FDD-81EC-7AC957B0D210}" type="slidenum">
               <a:rPr lang="fr-FR" smtClean="0"/>
-              <a:t>29</a:t>
+              <a:t>30</a:t>
             </a:fld>
             <a:endParaRPr lang="fr-FR"/>
           </a:p>
@@ -2507,7 +2619,7 @@
 </p:notes>
 </file>
 
-<file path=ppt/notesSlides/notesSlide26.xml><?xml version="1.0" encoding="utf-8"?>
+<file path=ppt/notesSlides/notesSlide27.xml><?xml version="1.0" encoding="utf-8"?>
 <p:notes xmlns:a="http://schemas.openxmlformats.org/drawingml/2006/main" xmlns:r="http://schemas.openxmlformats.org/officeDocument/2006/relationships" xmlns:p="http://schemas.openxmlformats.org/presentationml/2006/main">
   <p:cSld>
     <p:spTree>
@@ -2599,7 +2711,7 @@
           <a:p>
             <a:fld id="{6BDC53D4-8BF5-4FDD-81EC-7AC957B0D210}" type="slidenum">
               <a:rPr lang="fr-FR" smtClean="0"/>
-              <a:t>30</a:t>
+              <a:t>31</a:t>
             </a:fld>
             <a:endParaRPr lang="fr-FR"/>
           </a:p>
@@ -2618,7 +2730,7 @@
 </p:notes>
 </file>
 
-<file path=ppt/notesSlides/notesSlide27.xml><?xml version="1.0" encoding="utf-8"?>
+<file path=ppt/notesSlides/notesSlide28.xml><?xml version="1.0" encoding="utf-8"?>
 <p:notes xmlns:a="http://schemas.openxmlformats.org/drawingml/2006/main" xmlns:r="http://schemas.openxmlformats.org/officeDocument/2006/relationships" xmlns:p="http://schemas.openxmlformats.org/presentationml/2006/main">
   <p:cSld>
     <p:spTree>
@@ -2710,7 +2822,7 @@
           <a:p>
             <a:fld id="{6BDC53D4-8BF5-4FDD-81EC-7AC957B0D210}" type="slidenum">
               <a:rPr lang="fr-FR" smtClean="0"/>
-              <a:t>31</a:t>
+              <a:t>32</a:t>
             </a:fld>
             <a:endParaRPr lang="fr-FR"/>
           </a:p>
@@ -2729,7 +2841,7 @@
 </p:notes>
 </file>
 
-<file path=ppt/notesSlides/notesSlide28.xml><?xml version="1.0" encoding="utf-8"?>
+<file path=ppt/notesSlides/notesSlide29.xml><?xml version="1.0" encoding="utf-8"?>
 <p:notes xmlns:a="http://schemas.openxmlformats.org/drawingml/2006/main" xmlns:r="http://schemas.openxmlformats.org/officeDocument/2006/relationships" xmlns:p="http://schemas.openxmlformats.org/presentationml/2006/main">
   <p:cSld>
     <p:spTree>
@@ -2821,7 +2933,7 @@
           <a:p>
             <a:fld id="{6BDC53D4-8BF5-4FDD-81EC-7AC957B0D210}" type="slidenum">
               <a:rPr lang="fr-FR" smtClean="0"/>
-              <a:t>32</a:t>
+              <a:t>33</a:t>
             </a:fld>
             <a:endParaRPr lang="fr-FR"/>
           </a:p>
@@ -2831,117 +2943,6 @@
     <p:extLst>
       <p:ext uri="{BB962C8B-B14F-4D97-AF65-F5344CB8AC3E}">
         <p14:creationId xmlns:p14="http://schemas.microsoft.com/office/powerpoint/2010/main" val="3971000138"/>
-      </p:ext>
-    </p:extLst>
-  </p:cSld>
-  <p:clrMapOvr>
-    <a:masterClrMapping/>
-  </p:clrMapOvr>
-</p:notes>
-</file>
-
-<file path=ppt/notesSlides/notesSlide29.xml><?xml version="1.0" encoding="utf-8"?>
-<p:notes xmlns:a="http://schemas.openxmlformats.org/drawingml/2006/main" xmlns:r="http://schemas.openxmlformats.org/officeDocument/2006/relationships" xmlns:p="http://schemas.openxmlformats.org/presentationml/2006/main">
-  <p:cSld>
-    <p:spTree>
-      <p:nvGrpSpPr>
-        <p:cNvPr id="1" name="">
-          <a:extLst>
-            <a:ext uri="{FF2B5EF4-FFF2-40B4-BE49-F238E27FC236}">
-              <a16:creationId xmlns:a16="http://schemas.microsoft.com/office/drawing/2014/main" id="{EA4FF5E1-3009-F005-CDD0-596D16638A5A}"/>
-            </a:ext>
-          </a:extLst>
-        </p:cNvPr>
-        <p:cNvGrpSpPr/>
-        <p:nvPr/>
-      </p:nvGrpSpPr>
-      <p:grpSpPr>
-        <a:xfrm>
-          <a:off x="0" y="0"/>
-          <a:ext cx="0" cy="0"/>
-          <a:chOff x="0" y="0"/>
-          <a:chExt cx="0" cy="0"/>
-        </a:xfrm>
-      </p:grpSpPr>
-      <p:sp>
-        <p:nvSpPr>
-          <p:cNvPr id="2" name="Espace réservé de l'image des diapositives 1">
-            <a:extLst>
-              <a:ext uri="{FF2B5EF4-FFF2-40B4-BE49-F238E27FC236}">
-                <a16:creationId xmlns:a16="http://schemas.microsoft.com/office/drawing/2014/main" id="{5BAB38CC-EEDC-20FA-880B-D28BF90822D5}"/>
-              </a:ext>
-            </a:extLst>
-          </p:cNvPr>
-          <p:cNvSpPr>
-            <a:spLocks noGrp="1" noRot="1" noChangeAspect="1"/>
-          </p:cNvSpPr>
-          <p:nvPr>
-            <p:ph type="sldImg"/>
-          </p:nvPr>
-        </p:nvSpPr>
-        <p:spPr/>
-      </p:sp>
-      <p:sp>
-        <p:nvSpPr>
-          <p:cNvPr id="3" name="Espace réservé des notes 2">
-            <a:extLst>
-              <a:ext uri="{FF2B5EF4-FFF2-40B4-BE49-F238E27FC236}">
-                <a16:creationId xmlns:a16="http://schemas.microsoft.com/office/drawing/2014/main" id="{A40CA9D2-92C3-5A6C-C8E0-063842B90B0E}"/>
-              </a:ext>
-            </a:extLst>
-          </p:cNvPr>
-          <p:cNvSpPr>
-            <a:spLocks noGrp="1"/>
-          </p:cNvSpPr>
-          <p:nvPr>
-            <p:ph type="body" idx="1"/>
-          </p:nvPr>
-        </p:nvSpPr>
-        <p:spPr/>
-        <p:txBody>
-          <a:bodyPr/>
-          <a:lstStyle/>
-          <a:p>
-            <a:endParaRPr lang="fr-FR" dirty="0"/>
-          </a:p>
-          <a:p>
-            <a:endParaRPr lang="fr-FR" dirty="0"/>
-          </a:p>
-        </p:txBody>
-      </p:sp>
-      <p:sp>
-        <p:nvSpPr>
-          <p:cNvPr id="4" name="Espace réservé du numéro de diapositive 3">
-            <a:extLst>
-              <a:ext uri="{FF2B5EF4-FFF2-40B4-BE49-F238E27FC236}">
-                <a16:creationId xmlns:a16="http://schemas.microsoft.com/office/drawing/2014/main" id="{F801A8A5-7D7E-A335-BE2D-FA1009850E08}"/>
-              </a:ext>
-            </a:extLst>
-          </p:cNvPr>
-          <p:cNvSpPr>
-            <a:spLocks noGrp="1"/>
-          </p:cNvSpPr>
-          <p:nvPr>
-            <p:ph type="sldNum" sz="quarter" idx="5"/>
-          </p:nvPr>
-        </p:nvSpPr>
-        <p:spPr/>
-        <p:txBody>
-          <a:bodyPr/>
-          <a:lstStyle/>
-          <a:p>
-            <a:fld id="{6BDC53D4-8BF5-4FDD-81EC-7AC957B0D210}" type="slidenum">
-              <a:rPr lang="fr-FR" smtClean="0"/>
-              <a:t>33</a:t>
-            </a:fld>
-            <a:endParaRPr lang="fr-FR"/>
-          </a:p>
-        </p:txBody>
-      </p:sp>
-    </p:spTree>
-    <p:extLst>
-      <p:ext uri="{BB962C8B-B14F-4D97-AF65-F5344CB8AC3E}">
-        <p14:creationId xmlns:p14="http://schemas.microsoft.com/office/powerpoint/2010/main" val="4220910152"/>
       </p:ext>
     </p:extLst>
   </p:cSld>
@@ -3070,6 +3071,117 @@
         <p:cNvPr id="1" name="">
           <a:extLst>
             <a:ext uri="{FF2B5EF4-FFF2-40B4-BE49-F238E27FC236}">
+              <a16:creationId xmlns:a16="http://schemas.microsoft.com/office/drawing/2014/main" id="{EA4FF5E1-3009-F005-CDD0-596D16638A5A}"/>
+            </a:ext>
+          </a:extLst>
+        </p:cNvPr>
+        <p:cNvGrpSpPr/>
+        <p:nvPr/>
+      </p:nvGrpSpPr>
+      <p:grpSpPr>
+        <a:xfrm>
+          <a:off x="0" y="0"/>
+          <a:ext cx="0" cy="0"/>
+          <a:chOff x="0" y="0"/>
+          <a:chExt cx="0" cy="0"/>
+        </a:xfrm>
+      </p:grpSpPr>
+      <p:sp>
+        <p:nvSpPr>
+          <p:cNvPr id="2" name="Espace réservé de l'image des diapositives 1">
+            <a:extLst>
+              <a:ext uri="{FF2B5EF4-FFF2-40B4-BE49-F238E27FC236}">
+                <a16:creationId xmlns:a16="http://schemas.microsoft.com/office/drawing/2014/main" id="{5BAB38CC-EEDC-20FA-880B-D28BF90822D5}"/>
+              </a:ext>
+            </a:extLst>
+          </p:cNvPr>
+          <p:cNvSpPr>
+            <a:spLocks noGrp="1" noRot="1" noChangeAspect="1"/>
+          </p:cNvSpPr>
+          <p:nvPr>
+            <p:ph type="sldImg"/>
+          </p:nvPr>
+        </p:nvSpPr>
+        <p:spPr/>
+      </p:sp>
+      <p:sp>
+        <p:nvSpPr>
+          <p:cNvPr id="3" name="Espace réservé des notes 2">
+            <a:extLst>
+              <a:ext uri="{FF2B5EF4-FFF2-40B4-BE49-F238E27FC236}">
+                <a16:creationId xmlns:a16="http://schemas.microsoft.com/office/drawing/2014/main" id="{A40CA9D2-92C3-5A6C-C8E0-063842B90B0E}"/>
+              </a:ext>
+            </a:extLst>
+          </p:cNvPr>
+          <p:cNvSpPr>
+            <a:spLocks noGrp="1"/>
+          </p:cNvSpPr>
+          <p:nvPr>
+            <p:ph type="body" idx="1"/>
+          </p:nvPr>
+        </p:nvSpPr>
+        <p:spPr/>
+        <p:txBody>
+          <a:bodyPr/>
+          <a:lstStyle/>
+          <a:p>
+            <a:endParaRPr lang="fr-FR" dirty="0"/>
+          </a:p>
+          <a:p>
+            <a:endParaRPr lang="fr-FR" dirty="0"/>
+          </a:p>
+        </p:txBody>
+      </p:sp>
+      <p:sp>
+        <p:nvSpPr>
+          <p:cNvPr id="4" name="Espace réservé du numéro de diapositive 3">
+            <a:extLst>
+              <a:ext uri="{FF2B5EF4-FFF2-40B4-BE49-F238E27FC236}">
+                <a16:creationId xmlns:a16="http://schemas.microsoft.com/office/drawing/2014/main" id="{F801A8A5-7D7E-A335-BE2D-FA1009850E08}"/>
+              </a:ext>
+            </a:extLst>
+          </p:cNvPr>
+          <p:cNvSpPr>
+            <a:spLocks noGrp="1"/>
+          </p:cNvSpPr>
+          <p:nvPr>
+            <p:ph type="sldNum" sz="quarter" idx="5"/>
+          </p:nvPr>
+        </p:nvSpPr>
+        <p:spPr/>
+        <p:txBody>
+          <a:bodyPr/>
+          <a:lstStyle/>
+          <a:p>
+            <a:fld id="{6BDC53D4-8BF5-4FDD-81EC-7AC957B0D210}" type="slidenum">
+              <a:rPr lang="fr-FR" smtClean="0"/>
+              <a:t>34</a:t>
+            </a:fld>
+            <a:endParaRPr lang="fr-FR"/>
+          </a:p>
+        </p:txBody>
+      </p:sp>
+    </p:spTree>
+    <p:extLst>
+      <p:ext uri="{BB962C8B-B14F-4D97-AF65-F5344CB8AC3E}">
+        <p14:creationId xmlns:p14="http://schemas.microsoft.com/office/powerpoint/2010/main" val="4220910152"/>
+      </p:ext>
+    </p:extLst>
+  </p:cSld>
+  <p:clrMapOvr>
+    <a:masterClrMapping/>
+  </p:clrMapOvr>
+</p:notes>
+</file>
+
+<file path=ppt/notesSlides/notesSlide31.xml><?xml version="1.0" encoding="utf-8"?>
+<p:notes xmlns:a="http://schemas.openxmlformats.org/drawingml/2006/main" xmlns:r="http://schemas.openxmlformats.org/officeDocument/2006/relationships" xmlns:p="http://schemas.openxmlformats.org/presentationml/2006/main">
+  <p:cSld>
+    <p:spTree>
+      <p:nvGrpSpPr>
+        <p:cNvPr id="1" name="">
+          <a:extLst>
+            <a:ext uri="{FF2B5EF4-FFF2-40B4-BE49-F238E27FC236}">
               <a16:creationId xmlns:a16="http://schemas.microsoft.com/office/drawing/2014/main" id="{330D6A01-FE49-F74B-6CA6-49698FF68574}"/>
             </a:ext>
           </a:extLst>
@@ -3154,7 +3266,7 @@
           <a:p>
             <a:fld id="{6BDC53D4-8BF5-4FDD-81EC-7AC957B0D210}" type="slidenum">
               <a:rPr lang="fr-FR" smtClean="0"/>
-              <a:t>34</a:t>
+              <a:t>35</a:t>
             </a:fld>
             <a:endParaRPr lang="fr-FR"/>
           </a:p>
@@ -3173,7 +3285,7 @@
 </p:notes>
 </file>
 
-<file path=ppt/notesSlides/notesSlide31.xml><?xml version="1.0" encoding="utf-8"?>
+<file path=ppt/notesSlides/notesSlide32.xml><?xml version="1.0" encoding="utf-8"?>
 <p:notes xmlns:a="http://schemas.openxmlformats.org/drawingml/2006/main" xmlns:r="http://schemas.openxmlformats.org/officeDocument/2006/relationships" xmlns:p="http://schemas.openxmlformats.org/presentationml/2006/main">
   <p:cSld>
     <p:spTree>
@@ -3265,7 +3377,7 @@
           <a:p>
             <a:fld id="{6BDC53D4-8BF5-4FDD-81EC-7AC957B0D210}" type="slidenum">
               <a:rPr lang="fr-FR" smtClean="0"/>
-              <a:t>35</a:t>
+              <a:t>36</a:t>
             </a:fld>
             <a:endParaRPr lang="fr-FR"/>
           </a:p>
@@ -19483,8 +19595,16 @@
           </a:p>
           <a:p>
             <a:r>
+              <a:rPr lang="fr-FR" sz="1600" dirty="0">
+                <a:highlight>
+                  <a:srgbClr val="D6B4B2"/>
+                </a:highlight>
+              </a:rPr>
+              <a:t>animal2</a:t>
+            </a:r>
+            <a:r>
               <a:rPr lang="fr-FR" sz="1600" dirty="0"/>
-              <a:t>animal2 = Animal("Garfield", 2015)</a:t>
+              <a:t> = Animal("Garfield", 2015)</a:t>
             </a:r>
           </a:p>
         </p:txBody>
@@ -21822,6 +21942,1009 @@
         <p:cNvPr id="1" name="">
           <a:extLst>
             <a:ext uri="{FF2B5EF4-FFF2-40B4-BE49-F238E27FC236}">
+              <a16:creationId xmlns:a16="http://schemas.microsoft.com/office/drawing/2014/main" id="{8599067A-2C45-EC38-96A0-4CAE4065AC1A}"/>
+            </a:ext>
+          </a:extLst>
+        </p:cNvPr>
+        <p:cNvGrpSpPr/>
+        <p:nvPr/>
+      </p:nvGrpSpPr>
+      <p:grpSpPr>
+        <a:xfrm>
+          <a:off x="0" y="0"/>
+          <a:ext cx="0" cy="0"/>
+          <a:chOff x="0" y="0"/>
+          <a:chExt cx="0" cy="0"/>
+        </a:xfrm>
+      </p:grpSpPr>
+      <p:sp>
+        <p:nvSpPr>
+          <p:cNvPr id="3" name="Rectangle 2">
+            <a:extLst>
+              <a:ext uri="{FF2B5EF4-FFF2-40B4-BE49-F238E27FC236}">
+                <a16:creationId xmlns:a16="http://schemas.microsoft.com/office/drawing/2014/main" id="{48C19535-EC8D-0953-1DD9-B2B7A56DE827}"/>
+              </a:ext>
+            </a:extLst>
+          </p:cNvPr>
+          <p:cNvSpPr/>
+          <p:nvPr/>
+        </p:nvSpPr>
+        <p:spPr>
+          <a:xfrm>
+            <a:off x="673975" y="405113"/>
+            <a:ext cx="11020314" cy="937549"/>
+          </a:xfrm>
+          <a:prstGeom prst="rect">
+            <a:avLst/>
+          </a:prstGeom>
+          <a:solidFill>
+            <a:schemeClr val="bg1"/>
+          </a:solidFill>
+          <a:ln>
+            <a:solidFill>
+              <a:schemeClr val="bg1">
+                <a:lumMod val="95000"/>
+              </a:schemeClr>
+            </a:solidFill>
+          </a:ln>
+          <a:effectLst>
+            <a:outerShdw blurRad="50800" dist="38100" dir="2700000" algn="tl" rotWithShape="0">
+              <a:prstClr val="black">
+                <a:alpha val="40000"/>
+              </a:prstClr>
+            </a:outerShdw>
+          </a:effectLst>
+        </p:spPr>
+        <p:style>
+          <a:lnRef idx="2">
+            <a:schemeClr val="accent1">
+              <a:shade val="15000"/>
+            </a:schemeClr>
+          </a:lnRef>
+          <a:fillRef idx="1">
+            <a:schemeClr val="accent1"/>
+          </a:fillRef>
+          <a:effectRef idx="0">
+            <a:schemeClr val="accent1"/>
+          </a:effectRef>
+          <a:fontRef idx="minor">
+            <a:schemeClr val="lt1"/>
+          </a:fontRef>
+        </p:style>
+        <p:txBody>
+          <a:bodyPr rtlCol="0" anchor="ctr"/>
+          <a:lstStyle/>
+          <a:p>
+            <a:pPr algn="ctr"/>
+            <a:endParaRPr lang="fr-FR"/>
+          </a:p>
+        </p:txBody>
+      </p:sp>
+      <p:sp>
+        <p:nvSpPr>
+          <p:cNvPr id="2" name="Titre 1">
+            <a:extLst>
+              <a:ext uri="{FF2B5EF4-FFF2-40B4-BE49-F238E27FC236}">
+                <a16:creationId xmlns:a16="http://schemas.microsoft.com/office/drawing/2014/main" id="{0714C520-8252-4336-FF3C-6C9EF5580D10}"/>
+              </a:ext>
+            </a:extLst>
+          </p:cNvPr>
+          <p:cNvSpPr txBox="1">
+            <a:spLocks/>
+          </p:cNvSpPr>
+          <p:nvPr/>
+        </p:nvSpPr>
+        <p:spPr>
+          <a:xfrm>
+            <a:off x="907225" y="583365"/>
+            <a:ext cx="8970548" cy="701426"/>
+          </a:xfrm>
+          <a:prstGeom prst="rect">
+            <a:avLst/>
+          </a:prstGeom>
+        </p:spPr>
+        <p:txBody>
+          <a:bodyPr>
+            <a:normAutofit/>
+          </a:bodyPr>
+          <a:lstStyle>
+            <a:lvl1pPr algn="l" defTabSz="914400" rtl="0" eaLnBrk="1" latinLnBrk="0" hangingPunct="1">
+              <a:lnSpc>
+                <a:spcPct val="90000"/>
+              </a:lnSpc>
+              <a:spcBef>
+                <a:spcPct val="0"/>
+              </a:spcBef>
+              <a:buNone/>
+              <a:defRPr sz="4400" kern="1200">
+                <a:solidFill>
+                  <a:schemeClr val="tx1"/>
+                </a:solidFill>
+                <a:latin typeface="+mj-lt"/>
+                <a:ea typeface="+mj-ea"/>
+                <a:cs typeface="+mj-cs"/>
+              </a:defRPr>
+            </a:lvl1pPr>
+          </a:lstStyle>
+          <a:p>
+            <a:r>
+              <a:rPr lang="fr-FR" sz="4000" dirty="0"/>
+              <a:t>Utilisation d’une classe</a:t>
+            </a:r>
+          </a:p>
+        </p:txBody>
+      </p:sp>
+      <p:sp>
+        <p:nvSpPr>
+          <p:cNvPr id="7" name="Rectangle 6">
+            <a:extLst>
+              <a:ext uri="{FF2B5EF4-FFF2-40B4-BE49-F238E27FC236}">
+                <a16:creationId xmlns:a16="http://schemas.microsoft.com/office/drawing/2014/main" id="{B1F09A27-C958-1EE8-C2F3-9B79F8000DCC}"/>
+              </a:ext>
+            </a:extLst>
+          </p:cNvPr>
+          <p:cNvSpPr/>
+          <p:nvPr/>
+        </p:nvSpPr>
+        <p:spPr>
+          <a:xfrm>
+            <a:off x="619125" y="500258"/>
+            <a:ext cx="124142" cy="749808"/>
+          </a:xfrm>
+          <a:prstGeom prst="rect">
+            <a:avLst/>
+          </a:prstGeom>
+          <a:solidFill>
+            <a:srgbClr val="002060"/>
+          </a:solidFill>
+          <a:ln>
+            <a:noFill/>
+          </a:ln>
+        </p:spPr>
+        <p:style>
+          <a:lnRef idx="2">
+            <a:schemeClr val="accent1">
+              <a:shade val="15000"/>
+            </a:schemeClr>
+          </a:lnRef>
+          <a:fillRef idx="1">
+            <a:schemeClr val="accent1"/>
+          </a:fillRef>
+          <a:effectRef idx="0">
+            <a:schemeClr val="accent1"/>
+          </a:effectRef>
+          <a:fontRef idx="minor">
+            <a:schemeClr val="lt1"/>
+          </a:fontRef>
+        </p:style>
+        <p:txBody>
+          <a:bodyPr rtlCol="0" anchor="ctr"/>
+          <a:lstStyle/>
+          <a:p>
+            <a:pPr algn="ctr"/>
+            <a:endParaRPr lang="fr-FR"/>
+          </a:p>
+        </p:txBody>
+      </p:sp>
+      <p:pic>
+        <p:nvPicPr>
+          <p:cNvPr id="4" name="Image 3" descr="Une image contenant texte&#10;&#10;Description générée automatiquement">
+            <a:extLst>
+              <a:ext uri="{FF2B5EF4-FFF2-40B4-BE49-F238E27FC236}">
+                <a16:creationId xmlns:a16="http://schemas.microsoft.com/office/drawing/2014/main" id="{D9EB3B68-E96A-671D-BFAC-013ED4E27625}"/>
+              </a:ext>
+            </a:extLst>
+          </p:cNvPr>
+          <p:cNvPicPr>
+            <a:picLocks noChangeAspect="1"/>
+          </p:cNvPicPr>
+          <p:nvPr/>
+        </p:nvPicPr>
+        <p:blipFill>
+          <a:blip r:embed="rId3" cstate="print">
+            <a:extLst>
+              <a:ext uri="{28A0092B-C50C-407E-A947-70E740481C1C}">
+                <a14:useLocalDpi xmlns:a14="http://schemas.microsoft.com/office/drawing/2010/main" val="0"/>
+              </a:ext>
+            </a:extLst>
+          </a:blip>
+          <a:stretch>
+            <a:fillRect/>
+          </a:stretch>
+        </p:blipFill>
+        <p:spPr>
+          <a:xfrm>
+            <a:off x="9808481" y="509288"/>
+            <a:ext cx="1825291" cy="749808"/>
+          </a:xfrm>
+          <a:prstGeom prst="rect">
+            <a:avLst/>
+          </a:prstGeom>
+        </p:spPr>
+      </p:pic>
+      <p:sp>
+        <p:nvSpPr>
+          <p:cNvPr id="5" name="ZoneTexte 4">
+            <a:extLst>
+              <a:ext uri="{FF2B5EF4-FFF2-40B4-BE49-F238E27FC236}">
+                <a16:creationId xmlns:a16="http://schemas.microsoft.com/office/drawing/2014/main" id="{B14E0754-B755-C5DF-B2CE-98512D343ABC}"/>
+              </a:ext>
+            </a:extLst>
+          </p:cNvPr>
+          <p:cNvSpPr txBox="1"/>
+          <p:nvPr/>
+        </p:nvSpPr>
+        <p:spPr>
+          <a:xfrm>
+            <a:off x="1572223" y="1361430"/>
+            <a:ext cx="9931799" cy="369332"/>
+          </a:xfrm>
+          <a:prstGeom prst="rect">
+            <a:avLst/>
+          </a:prstGeom>
+          <a:noFill/>
+        </p:spPr>
+        <p:txBody>
+          <a:bodyPr wrap="square">
+            <a:spAutoFit/>
+          </a:bodyPr>
+          <a:lstStyle/>
+          <a:p>
+            <a:r>
+              <a:rPr lang="fr-FR" sz="1800" b="1" dirty="0"/>
+              <a:t>Liste d’objets</a:t>
+            </a:r>
+            <a:endParaRPr lang="fr-FR" sz="1800" dirty="0"/>
+          </a:p>
+        </p:txBody>
+      </p:sp>
+      <p:sp>
+        <p:nvSpPr>
+          <p:cNvPr id="6" name="ZoneTexte 5">
+            <a:extLst>
+              <a:ext uri="{FF2B5EF4-FFF2-40B4-BE49-F238E27FC236}">
+                <a16:creationId xmlns:a16="http://schemas.microsoft.com/office/drawing/2014/main" id="{4D651BCC-7F78-9D8C-F3E2-872E53C3A5A5}"/>
+              </a:ext>
+            </a:extLst>
+          </p:cNvPr>
+          <p:cNvSpPr txBox="1"/>
+          <p:nvPr/>
+        </p:nvSpPr>
+        <p:spPr>
+          <a:xfrm>
+            <a:off x="7804250" y="44933"/>
+            <a:ext cx="3679771" cy="307777"/>
+          </a:xfrm>
+          <a:prstGeom prst="rect">
+            <a:avLst/>
+          </a:prstGeom>
+          <a:noFill/>
+        </p:spPr>
+        <p:txBody>
+          <a:bodyPr wrap="square">
+            <a:spAutoFit/>
+          </a:bodyPr>
+          <a:lstStyle/>
+          <a:p>
+            <a:r>
+              <a:rPr lang="fr-FR" sz="1400" dirty="0"/>
+              <a:t>animal_1.py</a:t>
+            </a:r>
+          </a:p>
+        </p:txBody>
+      </p:sp>
+      <p:pic>
+        <p:nvPicPr>
+          <p:cNvPr id="8" name="Picture 4" descr="Résultat de recherche d'images pour &quot;python logo&quot;">
+            <a:extLst>
+              <a:ext uri="{FF2B5EF4-FFF2-40B4-BE49-F238E27FC236}">
+                <a16:creationId xmlns:a16="http://schemas.microsoft.com/office/drawing/2014/main" id="{0C896125-E7BE-A24B-4C41-3079603E373E}"/>
+              </a:ext>
+            </a:extLst>
+          </p:cNvPr>
+          <p:cNvPicPr>
+            <a:picLocks noChangeAspect="1" noChangeArrowheads="1"/>
+          </p:cNvPicPr>
+          <p:nvPr/>
+        </p:nvPicPr>
+        <p:blipFill>
+          <a:blip r:embed="rId4" cstate="print">
+            <a:extLst>
+              <a:ext uri="{28A0092B-C50C-407E-A947-70E740481C1C}">
+                <a14:useLocalDpi xmlns:a14="http://schemas.microsoft.com/office/drawing/2010/main" val="0"/>
+              </a:ext>
+            </a:extLst>
+          </a:blip>
+          <a:srcRect/>
+          <a:stretch>
+            <a:fillRect/>
+          </a:stretch>
+        </p:blipFill>
+        <p:spPr bwMode="auto">
+          <a:xfrm>
+            <a:off x="7531280" y="48320"/>
+            <a:ext cx="272970" cy="300073"/>
+          </a:xfrm>
+          <a:prstGeom prst="rect">
+            <a:avLst/>
+          </a:prstGeom>
+          <a:noFill/>
+          <a:extLst>
+            <a:ext uri="{909E8E84-426E-40DD-AFC4-6F175D3DCCD1}">
+              <a14:hiddenFill xmlns:a14="http://schemas.microsoft.com/office/drawing/2010/main">
+                <a:solidFill>
+                  <a:srgbClr val="FFFFFF"/>
+                </a:solidFill>
+              </a14:hiddenFill>
+            </a:ext>
+          </a:extLst>
+        </p:spPr>
+      </p:pic>
+      <p:sp>
+        <p:nvSpPr>
+          <p:cNvPr id="9" name="Rectangle 8">
+            <a:extLst>
+              <a:ext uri="{FF2B5EF4-FFF2-40B4-BE49-F238E27FC236}">
+                <a16:creationId xmlns:a16="http://schemas.microsoft.com/office/drawing/2014/main" id="{8C7E6EE4-3FBB-89D4-2D15-C83F5F7E9884}"/>
+              </a:ext>
+            </a:extLst>
+          </p:cNvPr>
+          <p:cNvSpPr/>
+          <p:nvPr/>
+        </p:nvSpPr>
+        <p:spPr>
+          <a:xfrm>
+            <a:off x="808897" y="2994712"/>
+            <a:ext cx="3337560" cy="434288"/>
+          </a:xfrm>
+          <a:prstGeom prst="rect">
+            <a:avLst/>
+          </a:prstGeom>
+          <a:solidFill>
+            <a:schemeClr val="accent3">
+              <a:lumMod val="60000"/>
+              <a:lumOff val="40000"/>
+            </a:schemeClr>
+          </a:solidFill>
+          <a:ln w="28575">
+            <a:solidFill>
+              <a:schemeClr val="tx1"/>
+            </a:solidFill>
+          </a:ln>
+        </p:spPr>
+        <p:style>
+          <a:lnRef idx="2">
+            <a:schemeClr val="accent1">
+              <a:shade val="15000"/>
+            </a:schemeClr>
+          </a:lnRef>
+          <a:fillRef idx="1">
+            <a:schemeClr val="accent1"/>
+          </a:fillRef>
+          <a:effectRef idx="0">
+            <a:schemeClr val="accent1"/>
+          </a:effectRef>
+          <a:fontRef idx="minor">
+            <a:schemeClr val="lt1"/>
+          </a:fontRef>
+        </p:style>
+        <p:txBody>
+          <a:bodyPr rtlCol="0" anchor="ctr"/>
+          <a:lstStyle/>
+          <a:p>
+            <a:pPr algn="ctr"/>
+            <a:r>
+              <a:rPr lang="fr-FR" sz="1600" b="1" dirty="0">
+                <a:solidFill>
+                  <a:schemeClr val="tx1"/>
+                </a:solidFill>
+              </a:rPr>
+              <a:t>Animal</a:t>
+            </a:r>
+          </a:p>
+        </p:txBody>
+      </p:sp>
+      <p:sp>
+        <p:nvSpPr>
+          <p:cNvPr id="10" name="Rectangle 9">
+            <a:extLst>
+              <a:ext uri="{FF2B5EF4-FFF2-40B4-BE49-F238E27FC236}">
+                <a16:creationId xmlns:a16="http://schemas.microsoft.com/office/drawing/2014/main" id="{AAD79C0E-80CF-9497-887B-8E02D527B690}"/>
+              </a:ext>
+            </a:extLst>
+          </p:cNvPr>
+          <p:cNvSpPr/>
+          <p:nvPr/>
+        </p:nvSpPr>
+        <p:spPr>
+          <a:xfrm>
+            <a:off x="808065" y="3421783"/>
+            <a:ext cx="3337560" cy="993815"/>
+          </a:xfrm>
+          <a:prstGeom prst="rect">
+            <a:avLst/>
+          </a:prstGeom>
+          <a:solidFill>
+            <a:srgbClr val="002060"/>
+          </a:solidFill>
+          <a:ln w="28575">
+            <a:solidFill>
+              <a:schemeClr val="tx1"/>
+            </a:solidFill>
+          </a:ln>
+        </p:spPr>
+        <p:style>
+          <a:lnRef idx="2">
+            <a:schemeClr val="accent1">
+              <a:shade val="15000"/>
+            </a:schemeClr>
+          </a:lnRef>
+          <a:fillRef idx="1">
+            <a:schemeClr val="accent1"/>
+          </a:fillRef>
+          <a:effectRef idx="0">
+            <a:schemeClr val="accent1"/>
+          </a:effectRef>
+          <a:fontRef idx="minor">
+            <a:schemeClr val="lt1"/>
+          </a:fontRef>
+        </p:style>
+        <p:txBody>
+          <a:bodyPr rtlCol="0" anchor="ctr"/>
+          <a:lstStyle/>
+          <a:p>
+            <a:pPr algn="ctr"/>
+            <a:r>
+              <a:rPr lang="fr-FR" sz="1600" dirty="0">
+                <a:solidFill>
+                  <a:schemeClr val="bg1"/>
+                </a:solidFill>
+              </a:rPr>
+              <a:t>+ </a:t>
+            </a:r>
+            <a:r>
+              <a:rPr lang="fr-FR" sz="1600" dirty="0" err="1">
+                <a:solidFill>
+                  <a:schemeClr val="bg1"/>
+                </a:solidFill>
+              </a:rPr>
+              <a:t>name</a:t>
+            </a:r>
+            <a:r>
+              <a:rPr lang="fr-FR" sz="1600" dirty="0">
+                <a:solidFill>
+                  <a:schemeClr val="bg1"/>
+                </a:solidFill>
+              </a:rPr>
+              <a:t>: </a:t>
+            </a:r>
+            <a:r>
+              <a:rPr lang="fr-FR" sz="1600" dirty="0" err="1">
+                <a:solidFill>
+                  <a:schemeClr val="bg1"/>
+                </a:solidFill>
+              </a:rPr>
+              <a:t>str</a:t>
+            </a:r>
+            <a:endParaRPr lang="fr-FR" sz="1600" dirty="0">
+              <a:solidFill>
+                <a:schemeClr val="bg1"/>
+              </a:solidFill>
+            </a:endParaRPr>
+          </a:p>
+          <a:p>
+            <a:pPr algn="ctr"/>
+            <a:r>
+              <a:rPr lang="fr-FR" sz="1600" dirty="0">
+                <a:solidFill>
+                  <a:schemeClr val="bg1"/>
+                </a:solidFill>
+              </a:rPr>
+              <a:t>+ </a:t>
+            </a:r>
+            <a:r>
+              <a:rPr lang="fr-FR" sz="1600" dirty="0" err="1">
+                <a:solidFill>
+                  <a:schemeClr val="bg1"/>
+                </a:solidFill>
+              </a:rPr>
+              <a:t>birthyear</a:t>
+            </a:r>
+            <a:r>
+              <a:rPr lang="fr-FR" sz="1600" dirty="0">
+                <a:solidFill>
+                  <a:schemeClr val="bg1"/>
+                </a:solidFill>
+              </a:rPr>
+              <a:t>: </a:t>
+            </a:r>
+            <a:r>
+              <a:rPr lang="fr-FR" sz="1600" dirty="0" err="1">
+                <a:solidFill>
+                  <a:schemeClr val="bg1"/>
+                </a:solidFill>
+              </a:rPr>
+              <a:t>int</a:t>
+            </a:r>
+            <a:r>
+              <a:rPr lang="fr-FR" sz="1600" dirty="0">
+                <a:solidFill>
+                  <a:schemeClr val="bg1"/>
+                </a:solidFill>
+              </a:rPr>
+              <a:t> </a:t>
+            </a:r>
+          </a:p>
+        </p:txBody>
+      </p:sp>
+      <p:sp>
+        <p:nvSpPr>
+          <p:cNvPr id="13" name="Rectangle 12">
+            <a:extLst>
+              <a:ext uri="{FF2B5EF4-FFF2-40B4-BE49-F238E27FC236}">
+                <a16:creationId xmlns:a16="http://schemas.microsoft.com/office/drawing/2014/main" id="{9988D768-FAA8-86E0-30B7-2FDED665B478}"/>
+              </a:ext>
+            </a:extLst>
+          </p:cNvPr>
+          <p:cNvSpPr/>
+          <p:nvPr/>
+        </p:nvSpPr>
+        <p:spPr>
+          <a:xfrm rot="16200000">
+            <a:off x="-48846" y="3791153"/>
+            <a:ext cx="993816" cy="255073"/>
+          </a:xfrm>
+          <a:prstGeom prst="rect">
+            <a:avLst/>
+          </a:prstGeom>
+          <a:solidFill>
+            <a:srgbClr val="002060"/>
+          </a:solidFill>
+          <a:ln>
+            <a:noFill/>
+          </a:ln>
+        </p:spPr>
+        <p:style>
+          <a:lnRef idx="2">
+            <a:schemeClr val="accent1">
+              <a:shade val="15000"/>
+            </a:schemeClr>
+          </a:lnRef>
+          <a:fillRef idx="1">
+            <a:schemeClr val="accent1"/>
+          </a:fillRef>
+          <a:effectRef idx="0">
+            <a:schemeClr val="accent1"/>
+          </a:effectRef>
+          <a:fontRef idx="minor">
+            <a:schemeClr val="lt1"/>
+          </a:fontRef>
+        </p:style>
+        <p:txBody>
+          <a:bodyPr vert="horz" rtlCol="0" anchor="ctr"/>
+          <a:lstStyle/>
+          <a:p>
+            <a:pPr algn="ctr"/>
+            <a:r>
+              <a:rPr lang="fr-FR" sz="1200" b="1" dirty="0"/>
+              <a:t>ETAT</a:t>
+            </a:r>
+          </a:p>
+        </p:txBody>
+      </p:sp>
+      <p:sp>
+        <p:nvSpPr>
+          <p:cNvPr id="17" name="ZoneTexte 16">
+            <a:extLst>
+              <a:ext uri="{FF2B5EF4-FFF2-40B4-BE49-F238E27FC236}">
+                <a16:creationId xmlns:a16="http://schemas.microsoft.com/office/drawing/2014/main" id="{6DDD84D2-5464-462D-F789-30260845CE22}"/>
+              </a:ext>
+            </a:extLst>
+          </p:cNvPr>
+          <p:cNvSpPr txBox="1"/>
+          <p:nvPr/>
+        </p:nvSpPr>
+        <p:spPr>
+          <a:xfrm>
+            <a:off x="5287103" y="3232069"/>
+            <a:ext cx="6096000" cy="830997"/>
+          </a:xfrm>
+          <a:prstGeom prst="rect">
+            <a:avLst/>
+          </a:prstGeom>
+          <a:solidFill>
+            <a:schemeClr val="bg1">
+              <a:lumMod val="85000"/>
+            </a:schemeClr>
+          </a:solidFill>
+        </p:spPr>
+        <p:txBody>
+          <a:bodyPr wrap="square">
+            <a:spAutoFit/>
+          </a:bodyPr>
+          <a:lstStyle/>
+          <a:p>
+            <a:r>
+              <a:rPr lang="en-US" sz="1600" dirty="0">
+                <a:highlight>
+                  <a:srgbClr val="D6B4B2"/>
+                </a:highlight>
+              </a:rPr>
+              <a:t>animal1</a:t>
+            </a:r>
+            <a:r>
+              <a:rPr lang="fr-FR" sz="1600" dirty="0"/>
+              <a:t> </a:t>
+            </a:r>
+            <a:r>
+              <a:rPr lang="fr-FR" sz="1600" b="1" dirty="0"/>
+              <a:t>=</a:t>
+            </a:r>
+            <a:r>
+              <a:rPr lang="fr-FR" sz="1600" dirty="0"/>
+              <a:t> Animal("Felix", 2021)</a:t>
+            </a:r>
+          </a:p>
+          <a:p>
+            <a:endParaRPr lang="fr-FR" sz="1600" dirty="0"/>
+          </a:p>
+          <a:p>
+            <a:r>
+              <a:rPr lang="fr-FR" sz="1600" dirty="0">
+                <a:highlight>
+                  <a:srgbClr val="D6B4B2"/>
+                </a:highlight>
+              </a:rPr>
+              <a:t>animal2</a:t>
+            </a:r>
+            <a:r>
+              <a:rPr lang="fr-FR" sz="1600" dirty="0"/>
+              <a:t> = Animal("Garfield", 2015)</a:t>
+            </a:r>
+          </a:p>
+        </p:txBody>
+      </p:sp>
+      <p:sp>
+        <p:nvSpPr>
+          <p:cNvPr id="11" name="Rectangle 10">
+            <a:extLst>
+              <a:ext uri="{FF2B5EF4-FFF2-40B4-BE49-F238E27FC236}">
+                <a16:creationId xmlns:a16="http://schemas.microsoft.com/office/drawing/2014/main" id="{1CF0ECBE-9D07-2C12-8C77-C5319FF2A575}"/>
+              </a:ext>
+            </a:extLst>
+          </p:cNvPr>
+          <p:cNvSpPr/>
+          <p:nvPr/>
+        </p:nvSpPr>
+        <p:spPr>
+          <a:xfrm>
+            <a:off x="808064" y="4415599"/>
+            <a:ext cx="3337560" cy="1060914"/>
+          </a:xfrm>
+          <a:prstGeom prst="rect">
+            <a:avLst/>
+          </a:prstGeom>
+          <a:solidFill>
+            <a:srgbClr val="00B0F0"/>
+          </a:solidFill>
+          <a:ln w="28575">
+            <a:solidFill>
+              <a:schemeClr val="tx1"/>
+            </a:solidFill>
+          </a:ln>
+        </p:spPr>
+        <p:style>
+          <a:lnRef idx="2">
+            <a:schemeClr val="accent1">
+              <a:shade val="15000"/>
+            </a:schemeClr>
+          </a:lnRef>
+          <a:fillRef idx="1">
+            <a:schemeClr val="accent1"/>
+          </a:fillRef>
+          <a:effectRef idx="0">
+            <a:schemeClr val="accent1"/>
+          </a:effectRef>
+          <a:fontRef idx="minor">
+            <a:schemeClr val="lt1"/>
+          </a:fontRef>
+        </p:style>
+        <p:txBody>
+          <a:bodyPr rtlCol="0" anchor="ctr"/>
+          <a:lstStyle/>
+          <a:p>
+            <a:pPr algn="ctr"/>
+            <a:r>
+              <a:rPr lang="fr-FR" sz="1600" dirty="0">
+                <a:solidFill>
+                  <a:schemeClr val="tx1"/>
+                </a:solidFill>
+              </a:rPr>
+              <a:t>+ move()</a:t>
+            </a:r>
+          </a:p>
+          <a:p>
+            <a:pPr algn="ctr"/>
+            <a:r>
+              <a:rPr lang="fr-FR" sz="1600" dirty="0">
+                <a:solidFill>
+                  <a:schemeClr val="tx1"/>
+                </a:solidFill>
+              </a:rPr>
+              <a:t>+ </a:t>
+            </a:r>
+            <a:r>
+              <a:rPr lang="fr-FR" sz="1600" dirty="0" err="1">
+                <a:solidFill>
+                  <a:schemeClr val="tx1"/>
+                </a:solidFill>
+              </a:rPr>
+              <a:t>get_age</a:t>
+            </a:r>
+            <a:r>
+              <a:rPr lang="fr-FR" sz="1600" dirty="0">
+                <a:solidFill>
+                  <a:schemeClr val="tx1"/>
+                </a:solidFill>
+              </a:rPr>
+              <a:t>(): </a:t>
+            </a:r>
+            <a:r>
+              <a:rPr lang="fr-FR" sz="1600" dirty="0" err="1">
+                <a:solidFill>
+                  <a:schemeClr val="tx1"/>
+                </a:solidFill>
+              </a:rPr>
+              <a:t>int</a:t>
+            </a:r>
+            <a:endParaRPr lang="fr-FR" sz="1600" dirty="0">
+              <a:solidFill>
+                <a:schemeClr val="tx1"/>
+              </a:solidFill>
+            </a:endParaRPr>
+          </a:p>
+        </p:txBody>
+      </p:sp>
+      <p:sp>
+        <p:nvSpPr>
+          <p:cNvPr id="12" name="Rectangle 11">
+            <a:extLst>
+              <a:ext uri="{FF2B5EF4-FFF2-40B4-BE49-F238E27FC236}">
+                <a16:creationId xmlns:a16="http://schemas.microsoft.com/office/drawing/2014/main" id="{A8D987DE-4EB7-A354-4697-AE0EB286EA6D}"/>
+              </a:ext>
+            </a:extLst>
+          </p:cNvPr>
+          <p:cNvSpPr/>
+          <p:nvPr/>
+        </p:nvSpPr>
+        <p:spPr>
+          <a:xfrm rot="16200000">
+            <a:off x="-82395" y="4818517"/>
+            <a:ext cx="1060913" cy="255073"/>
+          </a:xfrm>
+          <a:prstGeom prst="rect">
+            <a:avLst/>
+          </a:prstGeom>
+          <a:solidFill>
+            <a:srgbClr val="00B0F0"/>
+          </a:solidFill>
+          <a:ln>
+            <a:noFill/>
+          </a:ln>
+        </p:spPr>
+        <p:style>
+          <a:lnRef idx="2">
+            <a:schemeClr val="accent1">
+              <a:shade val="15000"/>
+            </a:schemeClr>
+          </a:lnRef>
+          <a:fillRef idx="1">
+            <a:schemeClr val="accent1"/>
+          </a:fillRef>
+          <a:effectRef idx="0">
+            <a:schemeClr val="accent1"/>
+          </a:effectRef>
+          <a:fontRef idx="minor">
+            <a:schemeClr val="lt1"/>
+          </a:fontRef>
+        </p:style>
+        <p:txBody>
+          <a:bodyPr vert="horz" rtlCol="0" anchor="ctr"/>
+          <a:lstStyle/>
+          <a:p>
+            <a:pPr algn="ctr"/>
+            <a:r>
+              <a:rPr lang="fr-FR" sz="700" b="1" dirty="0"/>
+              <a:t>COMPORTEMENT</a:t>
+            </a:r>
+          </a:p>
+        </p:txBody>
+      </p:sp>
+      <p:sp>
+        <p:nvSpPr>
+          <p:cNvPr id="14" name="ZoneTexte 13">
+            <a:extLst>
+              <a:ext uri="{FF2B5EF4-FFF2-40B4-BE49-F238E27FC236}">
+                <a16:creationId xmlns:a16="http://schemas.microsoft.com/office/drawing/2014/main" id="{14A1A9B5-7F77-F30C-8D27-98D69E0DC3FD}"/>
+              </a:ext>
+            </a:extLst>
+          </p:cNvPr>
+          <p:cNvSpPr txBox="1"/>
+          <p:nvPr/>
+        </p:nvSpPr>
+        <p:spPr>
+          <a:xfrm>
+            <a:off x="6525770" y="4175498"/>
+            <a:ext cx="4857333" cy="1077218"/>
+          </a:xfrm>
+          <a:prstGeom prst="rect">
+            <a:avLst/>
+          </a:prstGeom>
+          <a:solidFill>
+            <a:schemeClr val="bg1">
+              <a:lumMod val="85000"/>
+            </a:schemeClr>
+          </a:solidFill>
+        </p:spPr>
+        <p:txBody>
+          <a:bodyPr wrap="square">
+            <a:spAutoFit/>
+          </a:bodyPr>
+          <a:lstStyle/>
+          <a:p>
+            <a:r>
+              <a:rPr lang="en-US" sz="1600" dirty="0" err="1"/>
+              <a:t>animaux</a:t>
+            </a:r>
+            <a:r>
+              <a:rPr lang="en-US" sz="1600" dirty="0"/>
+              <a:t> = []</a:t>
+            </a:r>
+          </a:p>
+          <a:p>
+            <a:r>
+              <a:rPr lang="en-US" sz="1600" dirty="0" err="1"/>
+              <a:t>animaux</a:t>
+            </a:r>
+            <a:r>
+              <a:rPr lang="en-US" sz="1600" i="1" dirty="0" err="1"/>
+              <a:t>.append</a:t>
+            </a:r>
+            <a:r>
+              <a:rPr lang="en-US" sz="1600" i="1" dirty="0"/>
+              <a:t>(</a:t>
+            </a:r>
+            <a:r>
+              <a:rPr lang="en-US" sz="1600" dirty="0">
+                <a:highlight>
+                  <a:srgbClr val="D6B4B2"/>
+                </a:highlight>
+              </a:rPr>
+              <a:t>animal1</a:t>
+            </a:r>
+            <a:r>
+              <a:rPr lang="en-US" sz="1600" i="1" dirty="0"/>
+              <a:t>)</a:t>
+            </a:r>
+            <a:endParaRPr lang="en-US" sz="1600" dirty="0"/>
+          </a:p>
+          <a:p>
+            <a:r>
+              <a:rPr lang="en-US" sz="1600" dirty="0" err="1"/>
+              <a:t>animaux.</a:t>
+            </a:r>
+            <a:r>
+              <a:rPr lang="en-US" sz="1600" i="1" dirty="0" err="1"/>
+              <a:t>append</a:t>
+            </a:r>
+            <a:r>
+              <a:rPr lang="en-US" sz="1600" i="1" dirty="0"/>
+              <a:t>(</a:t>
+            </a:r>
+            <a:r>
+              <a:rPr lang="en-US" sz="1600" dirty="0">
+                <a:highlight>
+                  <a:srgbClr val="D6B4B2"/>
+                </a:highlight>
+              </a:rPr>
+              <a:t>animal2</a:t>
+            </a:r>
+            <a:r>
+              <a:rPr lang="en-US" sz="1600" i="1" dirty="0"/>
+              <a:t>)</a:t>
+            </a:r>
+            <a:endParaRPr lang="fr-FR" sz="1600" i="1" dirty="0"/>
+          </a:p>
+          <a:p>
+            <a:r>
+              <a:rPr lang="fr-FR" sz="1600" dirty="0"/>
+              <a:t>animaux[0]</a:t>
+            </a:r>
+            <a:r>
+              <a:rPr lang="fr-FR" sz="1600" b="1" i="1" dirty="0"/>
+              <a:t>.</a:t>
+            </a:r>
+            <a:r>
+              <a:rPr lang="fr-FR" sz="1600" i="1" dirty="0"/>
+              <a:t>move()</a:t>
+            </a:r>
+          </a:p>
+        </p:txBody>
+      </p:sp>
+      <p:sp>
+        <p:nvSpPr>
+          <p:cNvPr id="22" name="ZoneTexte 21">
+            <a:extLst>
+              <a:ext uri="{FF2B5EF4-FFF2-40B4-BE49-F238E27FC236}">
+                <a16:creationId xmlns:a16="http://schemas.microsoft.com/office/drawing/2014/main" id="{1AA3BC9A-A6A0-DA1A-204A-674B2C240CA6}"/>
+              </a:ext>
+            </a:extLst>
+          </p:cNvPr>
+          <p:cNvSpPr txBox="1"/>
+          <p:nvPr/>
+        </p:nvSpPr>
+        <p:spPr>
+          <a:xfrm>
+            <a:off x="7004750" y="5357307"/>
+            <a:ext cx="4378353" cy="338554"/>
+          </a:xfrm>
+          <a:prstGeom prst="rect">
+            <a:avLst/>
+          </a:prstGeom>
+          <a:solidFill>
+            <a:schemeClr val="bg1">
+              <a:lumMod val="95000"/>
+            </a:schemeClr>
+          </a:solidFill>
+          <a:ln>
+            <a:solidFill>
+              <a:schemeClr val="accent1"/>
+            </a:solidFill>
+          </a:ln>
+        </p:spPr>
+        <p:txBody>
+          <a:bodyPr wrap="square">
+            <a:spAutoFit/>
+          </a:bodyPr>
+          <a:lstStyle/>
+          <a:p>
+            <a:r>
+              <a:rPr lang="en-US" sz="1600" dirty="0"/>
+              <a:t>&gt;&gt;&gt;    [ </a:t>
+            </a:r>
+            <a:r>
+              <a:rPr lang="fr-FR" sz="1600" dirty="0"/>
+              <a:t>Felix</a:t>
+            </a:r>
+            <a:r>
+              <a:rPr lang="en-US" sz="1600" dirty="0"/>
+              <a:t> ] is moving</a:t>
+            </a:r>
+            <a:endParaRPr lang="fr-FR" sz="1600" dirty="0"/>
+          </a:p>
+        </p:txBody>
+      </p:sp>
+    </p:spTree>
+    <p:extLst>
+      <p:ext uri="{BB962C8B-B14F-4D97-AF65-F5344CB8AC3E}">
+        <p14:creationId xmlns:p14="http://schemas.microsoft.com/office/powerpoint/2010/main" val="2688467117"/>
+      </p:ext>
+    </p:extLst>
+  </p:cSld>
+  <p:clrMapOvr>
+    <a:masterClrMapping/>
+  </p:clrMapOvr>
+</p:sld>
+</file>
+
+<file path=ppt/slides/slide21.xml><?xml version="1.0" encoding="utf-8"?>
+<p:sld xmlns:a="http://schemas.openxmlformats.org/drawingml/2006/main" xmlns:r="http://schemas.openxmlformats.org/officeDocument/2006/relationships" xmlns:p="http://schemas.openxmlformats.org/presentationml/2006/main">
+  <p:cSld>
+    <p:spTree>
+      <p:nvGrpSpPr>
+        <p:cNvPr id="1" name="">
+          <a:extLst>
+            <a:ext uri="{FF2B5EF4-FFF2-40B4-BE49-F238E27FC236}">
               <a16:creationId xmlns:a16="http://schemas.microsoft.com/office/drawing/2014/main" id="{F08E1D39-91CD-1910-89B3-40B034E4C30D}"/>
             </a:ext>
           </a:extLst>
@@ -22957,7 +24080,7 @@
 </p:sld>
 </file>
 
-<file path=ppt/slides/slide21.xml><?xml version="1.0" encoding="utf-8"?>
+<file path=ppt/slides/slide22.xml><?xml version="1.0" encoding="utf-8"?>
 <p:sld xmlns:a="http://schemas.openxmlformats.org/drawingml/2006/main" xmlns:r="http://schemas.openxmlformats.org/officeDocument/2006/relationships" xmlns:p="http://schemas.openxmlformats.org/presentationml/2006/main">
   <p:cSld>
     <p:spTree>
@@ -24379,7 +25502,7 @@
 </p:sld>
 </file>
 
-<file path=ppt/slides/slide22.xml><?xml version="1.0" encoding="utf-8"?>
+<file path=ppt/slides/slide23.xml><?xml version="1.0" encoding="utf-8"?>
 <p:sld xmlns:a="http://schemas.openxmlformats.org/drawingml/2006/main" xmlns:r="http://schemas.openxmlformats.org/officeDocument/2006/relationships" xmlns:p="http://schemas.openxmlformats.org/presentationml/2006/main">
   <p:cSld>
     <p:spTree>
@@ -24979,164 +26102,6 @@
       </p:sp>
       <p:sp>
         <p:nvSpPr>
-          <p:cNvPr id="16" name="ZoneTexte 15">
-            <a:extLst>
-              <a:ext uri="{FF2B5EF4-FFF2-40B4-BE49-F238E27FC236}">
-                <a16:creationId xmlns:a16="http://schemas.microsoft.com/office/drawing/2014/main" id="{188499B1-252D-9494-DBAB-E80742B8068E}"/>
-              </a:ext>
-            </a:extLst>
-          </p:cNvPr>
-          <p:cNvSpPr txBox="1"/>
-          <p:nvPr/>
-        </p:nvSpPr>
-        <p:spPr>
-          <a:xfrm>
-            <a:off x="7667765" y="1798968"/>
-            <a:ext cx="6497160" cy="1077218"/>
-          </a:xfrm>
-          <a:prstGeom prst="rect">
-            <a:avLst/>
-          </a:prstGeom>
-          <a:solidFill>
-            <a:schemeClr val="bg1">
-              <a:lumMod val="95000"/>
-            </a:schemeClr>
-          </a:solidFill>
-        </p:spPr>
-        <p:txBody>
-          <a:bodyPr wrap="square">
-            <a:spAutoFit/>
-          </a:bodyPr>
-          <a:lstStyle/>
-          <a:p>
-            <a:r>
-              <a:rPr lang="fr-FR" sz="1600" b="1" dirty="0"/>
-              <a:t>	</a:t>
-            </a:r>
-            <a:r>
-              <a:rPr lang="fr-FR" sz="1600" b="1" dirty="0" err="1"/>
-              <a:t>def</a:t>
-            </a:r>
-            <a:r>
-              <a:rPr lang="fr-FR" sz="1600" b="1" dirty="0"/>
-              <a:t> </a:t>
-            </a:r>
-            <a:r>
-              <a:rPr lang="fr-FR" sz="1600" i="1" dirty="0"/>
-              <a:t>__</a:t>
-            </a:r>
-            <a:r>
-              <a:rPr lang="fr-FR" sz="1600" i="1" dirty="0" err="1"/>
-              <a:t>str</a:t>
-            </a:r>
-            <a:r>
-              <a:rPr lang="fr-FR" sz="1600" i="1" dirty="0"/>
-              <a:t>__</a:t>
-            </a:r>
-            <a:r>
-              <a:rPr lang="fr-FR" sz="1600" dirty="0"/>
-              <a:t>(</a:t>
-            </a:r>
-            <a:r>
-              <a:rPr lang="fr-FR" sz="1600" b="1" dirty="0"/>
-              <a:t>self</a:t>
-            </a:r>
-            <a:r>
-              <a:rPr lang="fr-FR" sz="1600" dirty="0"/>
-              <a:t>):</a:t>
-            </a:r>
-          </a:p>
-          <a:p>
-            <a:r>
-              <a:rPr lang="fr-FR" sz="1600" b="1" dirty="0"/>
-              <a:t>		</a:t>
-            </a:r>
-            <a:r>
-              <a:rPr lang="fr-FR" sz="1600" dirty="0" err="1"/>
-              <a:t>str</a:t>
-            </a:r>
-            <a:r>
-              <a:rPr lang="fr-FR" sz="1600" b="1" dirty="0"/>
-              <a:t> = </a:t>
-            </a:r>
-            <a:r>
-              <a:rPr lang="fr-FR" sz="1600" b="1" i="1" dirty="0" err="1"/>
-              <a:t>f"</a:t>
-            </a:r>
-            <a:r>
-              <a:rPr lang="fr-FR" sz="1600" dirty="0" err="1"/>
-              <a:t>Animal</a:t>
-            </a:r>
-            <a:r>
-              <a:rPr lang="fr-FR" sz="1600" dirty="0"/>
-              <a:t> [ </a:t>
-            </a:r>
-            <a:r>
-              <a:rPr lang="fr-FR" sz="1600" b="1" dirty="0"/>
-              <a:t>{self.name} </a:t>
-            </a:r>
-            <a:r>
-              <a:rPr lang="fr-FR" sz="1600" dirty="0"/>
-              <a:t>] </a:t>
-            </a:r>
-            <a:r>
-              <a:rPr lang="fr-FR" sz="1600" b="1" dirty="0" err="1"/>
-              <a:t>born</a:t>
-            </a:r>
-            <a:r>
-              <a:rPr lang="fr-FR" sz="1600" b="1" dirty="0"/>
-              <a:t> in {</a:t>
-            </a:r>
-            <a:r>
-              <a:rPr lang="fr-FR" sz="1600" b="1" dirty="0" err="1"/>
-              <a:t>self.birthyear</a:t>
-            </a:r>
-            <a:r>
-              <a:rPr lang="fr-FR" sz="1600" b="1" dirty="0"/>
-              <a:t>}</a:t>
-            </a:r>
-            <a:r>
-              <a:rPr lang="fr-FR" sz="1600" b="1" i="1" dirty="0"/>
-              <a:t>"</a:t>
-            </a:r>
-          </a:p>
-          <a:p>
-            <a:r>
-              <a:rPr lang="fr-FR" sz="1600" b="1" dirty="0"/>
-              <a:t>		</a:t>
-            </a:r>
-            <a:r>
-              <a:rPr lang="fr-FR" sz="1600" b="1" dirty="0" err="1"/>
-              <a:t>str</a:t>
-            </a:r>
-            <a:r>
-              <a:rPr lang="fr-FR" sz="1600" b="1" dirty="0"/>
-              <a:t> += f" ({</a:t>
-            </a:r>
-            <a:r>
-              <a:rPr lang="fr-FR" sz="1600" b="1" dirty="0" err="1"/>
-              <a:t>self.get_age</a:t>
-            </a:r>
-            <a:r>
-              <a:rPr lang="fr-FR" sz="1600" b="1" dirty="0"/>
-              <a:t>()} yo)"</a:t>
-            </a:r>
-          </a:p>
-          <a:p>
-            <a:r>
-              <a:rPr lang="fr-FR" sz="1600" b="1" dirty="0"/>
-              <a:t>		return </a:t>
-            </a:r>
-            <a:r>
-              <a:rPr lang="fr-FR" sz="1600" b="1" dirty="0" err="1"/>
-              <a:t>str</a:t>
-            </a:r>
-            <a:endParaRPr lang="fr-FR" sz="1600" dirty="0"/>
-          </a:p>
-        </p:txBody>
-      </p:sp>
-      <p:sp>
-        <p:nvSpPr>
           <p:cNvPr id="18" name="Rectangle 17">
             <a:extLst>
               <a:ext uri="{FF2B5EF4-FFF2-40B4-BE49-F238E27FC236}">
@@ -25530,119 +26495,6 @@
             <a:r>
               <a:rPr lang="fr-FR" sz="700" b="1" dirty="0"/>
               <a:t>COMPORTEMENT</a:t>
-            </a:r>
-          </a:p>
-        </p:txBody>
-      </p:sp>
-      <p:sp>
-        <p:nvSpPr>
-          <p:cNvPr id="22" name="ZoneTexte 21">
-            <a:extLst>
-              <a:ext uri="{FF2B5EF4-FFF2-40B4-BE49-F238E27FC236}">
-                <a16:creationId xmlns:a16="http://schemas.microsoft.com/office/drawing/2014/main" id="{28FE1DD2-E912-C275-3752-0CF922B01FD8}"/>
-              </a:ext>
-            </a:extLst>
-          </p:cNvPr>
-          <p:cNvSpPr txBox="1"/>
-          <p:nvPr/>
-        </p:nvSpPr>
-        <p:spPr>
-          <a:xfrm>
-            <a:off x="7531280" y="602014"/>
-            <a:ext cx="6096000" cy="584775"/>
-          </a:xfrm>
-          <a:prstGeom prst="rect">
-            <a:avLst/>
-          </a:prstGeom>
-          <a:solidFill>
-            <a:schemeClr val="bg1">
-              <a:lumMod val="95000"/>
-            </a:schemeClr>
-          </a:solidFill>
-        </p:spPr>
-        <p:txBody>
-          <a:bodyPr wrap="square">
-            <a:spAutoFit/>
-          </a:bodyPr>
-          <a:lstStyle/>
-          <a:p>
-            <a:r>
-              <a:rPr lang="fr-FR" sz="1600" b="1" dirty="0"/>
-              <a:t>	</a:t>
-            </a:r>
-            <a:r>
-              <a:rPr lang="fr-FR" sz="1600" b="1" dirty="0" err="1"/>
-              <a:t>def</a:t>
-            </a:r>
-            <a:r>
-              <a:rPr lang="fr-FR" sz="1600" b="1" dirty="0"/>
-              <a:t> </a:t>
-            </a:r>
-            <a:r>
-              <a:rPr lang="fr-FR" sz="1600" dirty="0"/>
-              <a:t>move(</a:t>
-            </a:r>
-            <a:r>
-              <a:rPr lang="fr-FR" sz="1600" b="1" dirty="0"/>
-              <a:t>self</a:t>
-            </a:r>
-            <a:r>
-              <a:rPr lang="fr-FR" sz="1600" dirty="0"/>
-              <a:t>):</a:t>
-            </a:r>
-          </a:p>
-          <a:p>
-            <a:r>
-              <a:rPr lang="fr-FR" sz="1600" dirty="0"/>
-              <a:t>		</a:t>
-            </a:r>
-            <a:r>
-              <a:rPr lang="fr-FR" sz="1600" b="1" dirty="0" err="1"/>
-              <a:t>print</a:t>
-            </a:r>
-            <a:r>
-              <a:rPr lang="fr-FR" sz="1600" dirty="0"/>
-              <a:t>(</a:t>
-            </a:r>
-            <a:r>
-              <a:rPr lang="fr-FR" sz="1600" b="1" i="1" dirty="0"/>
-              <a:t>f"</a:t>
-            </a:r>
-            <a:r>
-              <a:rPr lang="fr-FR" sz="1600" dirty="0"/>
-              <a:t>\t[ {</a:t>
-            </a:r>
-            <a:r>
-              <a:rPr lang="fr-FR" sz="1600" b="1" dirty="0"/>
-              <a:t>self.</a:t>
-            </a:r>
-            <a:r>
-              <a:rPr lang="fr-FR" sz="1600" i="1" dirty="0"/>
-              <a:t>name</a:t>
-            </a:r>
-            <a:r>
-              <a:rPr lang="fr-FR" sz="1600" dirty="0"/>
-              <a:t>} ] </a:t>
-            </a:r>
-            <a:r>
-              <a:rPr lang="fr-FR" sz="1600" dirty="0" err="1"/>
-              <a:t>is</a:t>
-            </a:r>
-            <a:r>
-              <a:rPr lang="fr-FR" sz="1600" dirty="0"/>
-              <a:t> </a:t>
-            </a:r>
-            <a:r>
-              <a:rPr lang="fr-FR" sz="1600" dirty="0" err="1"/>
-              <a:t>moving</a:t>
-            </a:r>
-            <a:r>
-              <a:rPr lang="fr-FR" sz="1600" b="1" i="1" dirty="0"/>
-              <a:t>"</a:t>
-            </a:r>
-            <a:r>
-              <a:rPr lang="fr-FR" sz="1600" dirty="0"/>
-              <a:t>)</a:t>
             </a:r>
           </a:p>
         </p:txBody>
@@ -26030,7 +26882,7 @@
 </p:sld>
 </file>
 
-<file path=ppt/slides/slide23.xml><?xml version="1.0" encoding="utf-8"?>
+<file path=ppt/slides/slide24.xml><?xml version="1.0" encoding="utf-8"?>
 <p:sld xmlns:a="http://schemas.openxmlformats.org/drawingml/2006/main" xmlns:r="http://schemas.openxmlformats.org/officeDocument/2006/relationships" xmlns:p="http://schemas.openxmlformats.org/presentationml/2006/main">
   <p:cSld>
     <p:spTree>
@@ -27113,7 +27965,7 @@
 </p:sld>
 </file>
 
-<file path=ppt/slides/slide24.xml><?xml version="1.0" encoding="utf-8"?>
+<file path=ppt/slides/slide25.xml><?xml version="1.0" encoding="utf-8"?>
 <p:sld xmlns:a="http://schemas.openxmlformats.org/drawingml/2006/main" xmlns:r="http://schemas.openxmlformats.org/officeDocument/2006/relationships" xmlns:p="http://schemas.openxmlformats.org/presentationml/2006/main">
   <p:cSld>
     <p:bg>
@@ -27625,7 +28477,7 @@
 </p:sld>
 </file>
 
-<file path=ppt/slides/slide25.xml><?xml version="1.0" encoding="utf-8"?>
+<file path=ppt/slides/slide26.xml><?xml version="1.0" encoding="utf-8"?>
 <p:sld xmlns:a="http://schemas.openxmlformats.org/drawingml/2006/main" xmlns:r="http://schemas.openxmlformats.org/officeDocument/2006/relationships" xmlns:p="http://schemas.openxmlformats.org/presentationml/2006/main">
   <p:cSld>
     <p:spTree>
@@ -28323,7 +29175,7 @@
 </p:sld>
 </file>
 
-<file path=ppt/slides/slide26.xml><?xml version="1.0" encoding="utf-8"?>
+<file path=ppt/slides/slide27.xml><?xml version="1.0" encoding="utf-8"?>
 <p:sld xmlns:a="http://schemas.openxmlformats.org/drawingml/2006/main" xmlns:r="http://schemas.openxmlformats.org/officeDocument/2006/relationships" xmlns:p="http://schemas.openxmlformats.org/presentationml/2006/main">
   <p:cSld>
     <p:spTree>
@@ -29262,7 +30114,7 @@
 </p:sld>
 </file>
 
-<file path=ppt/slides/slide27.xml><?xml version="1.0" encoding="utf-8"?>
+<file path=ppt/slides/slide28.xml><?xml version="1.0" encoding="utf-8"?>
 <p:sld xmlns:a="http://schemas.openxmlformats.org/drawingml/2006/main" xmlns:r="http://schemas.openxmlformats.org/officeDocument/2006/relationships" xmlns:p="http://schemas.openxmlformats.org/presentationml/2006/main">
   <p:cSld>
     <p:spTree>
@@ -30021,7 +30873,7 @@
 </p:sld>
 </file>
 
-<file path=ppt/slides/slide28.xml><?xml version="1.0" encoding="utf-8"?>
+<file path=ppt/slides/slide29.xml><?xml version="1.0" encoding="utf-8"?>
 <p:sld xmlns:a="http://schemas.openxmlformats.org/drawingml/2006/main" xmlns:r="http://schemas.openxmlformats.org/officeDocument/2006/relationships" xmlns:p="http://schemas.openxmlformats.org/presentationml/2006/main">
   <p:cSld>
     <p:spTree>
@@ -30998,1047 +31850,6 @@
     <p:extLst>
       <p:ext uri="{BB962C8B-B14F-4D97-AF65-F5344CB8AC3E}">
         <p14:creationId xmlns:p14="http://schemas.microsoft.com/office/powerpoint/2010/main" val="1454686517"/>
-      </p:ext>
-    </p:extLst>
-  </p:cSld>
-  <p:clrMapOvr>
-    <a:masterClrMapping/>
-  </p:clrMapOvr>
-</p:sld>
-</file>
-
-<file path=ppt/slides/slide29.xml><?xml version="1.0" encoding="utf-8"?>
-<p:sld xmlns:a="http://schemas.openxmlformats.org/drawingml/2006/main" xmlns:r="http://schemas.openxmlformats.org/officeDocument/2006/relationships" xmlns:p="http://schemas.openxmlformats.org/presentationml/2006/main">
-  <p:cSld>
-    <p:spTree>
-      <p:nvGrpSpPr>
-        <p:cNvPr id="1" name="">
-          <a:extLst>
-            <a:ext uri="{FF2B5EF4-FFF2-40B4-BE49-F238E27FC236}">
-              <a16:creationId xmlns:a16="http://schemas.microsoft.com/office/drawing/2014/main" id="{9A54251C-96BC-3BDA-5221-A4EAF4CB9E7E}"/>
-            </a:ext>
-          </a:extLst>
-        </p:cNvPr>
-        <p:cNvGrpSpPr/>
-        <p:nvPr/>
-      </p:nvGrpSpPr>
-      <p:grpSpPr>
-        <a:xfrm>
-          <a:off x="0" y="0"/>
-          <a:ext cx="0" cy="0"/>
-          <a:chOff x="0" y="0"/>
-          <a:chExt cx="0" cy="0"/>
-        </a:xfrm>
-      </p:grpSpPr>
-      <p:sp>
-        <p:nvSpPr>
-          <p:cNvPr id="3" name="Rectangle 2">
-            <a:extLst>
-              <a:ext uri="{FF2B5EF4-FFF2-40B4-BE49-F238E27FC236}">
-                <a16:creationId xmlns:a16="http://schemas.microsoft.com/office/drawing/2014/main" id="{41A30C78-275B-09F5-38D0-3F2B63785CE5}"/>
-              </a:ext>
-            </a:extLst>
-          </p:cNvPr>
-          <p:cNvSpPr/>
-          <p:nvPr/>
-        </p:nvSpPr>
-        <p:spPr>
-          <a:xfrm>
-            <a:off x="673975" y="405113"/>
-            <a:ext cx="11020314" cy="937549"/>
-          </a:xfrm>
-          <a:prstGeom prst="rect">
-            <a:avLst/>
-          </a:prstGeom>
-          <a:solidFill>
-            <a:schemeClr val="bg1"/>
-          </a:solidFill>
-          <a:ln>
-            <a:solidFill>
-              <a:schemeClr val="bg1">
-                <a:lumMod val="95000"/>
-              </a:schemeClr>
-            </a:solidFill>
-          </a:ln>
-          <a:effectLst>
-            <a:outerShdw blurRad="50800" dist="38100" dir="2700000" algn="tl" rotWithShape="0">
-              <a:prstClr val="black">
-                <a:alpha val="40000"/>
-              </a:prstClr>
-            </a:outerShdw>
-          </a:effectLst>
-        </p:spPr>
-        <p:style>
-          <a:lnRef idx="2">
-            <a:schemeClr val="accent1">
-              <a:shade val="15000"/>
-            </a:schemeClr>
-          </a:lnRef>
-          <a:fillRef idx="1">
-            <a:schemeClr val="accent1"/>
-          </a:fillRef>
-          <a:effectRef idx="0">
-            <a:schemeClr val="accent1"/>
-          </a:effectRef>
-          <a:fontRef idx="minor">
-            <a:schemeClr val="lt1"/>
-          </a:fontRef>
-        </p:style>
-        <p:txBody>
-          <a:bodyPr rtlCol="0" anchor="ctr"/>
-          <a:lstStyle/>
-          <a:p>
-            <a:pPr algn="ctr"/>
-            <a:endParaRPr lang="fr-FR"/>
-          </a:p>
-        </p:txBody>
-      </p:sp>
-      <p:sp>
-        <p:nvSpPr>
-          <p:cNvPr id="2" name="Titre 1">
-            <a:extLst>
-              <a:ext uri="{FF2B5EF4-FFF2-40B4-BE49-F238E27FC236}">
-                <a16:creationId xmlns:a16="http://schemas.microsoft.com/office/drawing/2014/main" id="{E7C445E5-30AE-1ADD-7E4C-B45E6A9B1DEE}"/>
-              </a:ext>
-            </a:extLst>
-          </p:cNvPr>
-          <p:cNvSpPr txBox="1">
-            <a:spLocks/>
-          </p:cNvSpPr>
-          <p:nvPr/>
-        </p:nvSpPr>
-        <p:spPr>
-          <a:xfrm>
-            <a:off x="907225" y="583365"/>
-            <a:ext cx="8970548" cy="701426"/>
-          </a:xfrm>
-          <a:prstGeom prst="rect">
-            <a:avLst/>
-          </a:prstGeom>
-        </p:spPr>
-        <p:txBody>
-          <a:bodyPr>
-            <a:normAutofit/>
-          </a:bodyPr>
-          <a:lstStyle>
-            <a:lvl1pPr algn="l" defTabSz="914400" rtl="0" eaLnBrk="1" latinLnBrk="0" hangingPunct="1">
-              <a:lnSpc>
-                <a:spcPct val="90000"/>
-              </a:lnSpc>
-              <a:spcBef>
-                <a:spcPct val="0"/>
-              </a:spcBef>
-              <a:buNone/>
-              <a:defRPr sz="4400" kern="1200">
-                <a:solidFill>
-                  <a:schemeClr val="tx1"/>
-                </a:solidFill>
-                <a:latin typeface="+mj-lt"/>
-                <a:ea typeface="+mj-ea"/>
-                <a:cs typeface="+mj-cs"/>
-              </a:defRPr>
-            </a:lvl1pPr>
-          </a:lstStyle>
-          <a:p>
-            <a:r>
-              <a:rPr lang="fr-FR" sz="4000" dirty="0"/>
-              <a:t>S’entrainer à la POO</a:t>
-            </a:r>
-          </a:p>
-        </p:txBody>
-      </p:sp>
-      <p:sp>
-        <p:nvSpPr>
-          <p:cNvPr id="7" name="Rectangle 6">
-            <a:extLst>
-              <a:ext uri="{FF2B5EF4-FFF2-40B4-BE49-F238E27FC236}">
-                <a16:creationId xmlns:a16="http://schemas.microsoft.com/office/drawing/2014/main" id="{7236EF15-D614-55ED-99E3-280AFCC1953E}"/>
-              </a:ext>
-            </a:extLst>
-          </p:cNvPr>
-          <p:cNvSpPr/>
-          <p:nvPr/>
-        </p:nvSpPr>
-        <p:spPr>
-          <a:xfrm>
-            <a:off x="619125" y="500258"/>
-            <a:ext cx="124142" cy="749808"/>
-          </a:xfrm>
-          <a:prstGeom prst="rect">
-            <a:avLst/>
-          </a:prstGeom>
-          <a:solidFill>
-            <a:srgbClr val="002060"/>
-          </a:solidFill>
-          <a:ln>
-            <a:noFill/>
-          </a:ln>
-        </p:spPr>
-        <p:style>
-          <a:lnRef idx="2">
-            <a:schemeClr val="accent1">
-              <a:shade val="15000"/>
-            </a:schemeClr>
-          </a:lnRef>
-          <a:fillRef idx="1">
-            <a:schemeClr val="accent1"/>
-          </a:fillRef>
-          <a:effectRef idx="0">
-            <a:schemeClr val="accent1"/>
-          </a:effectRef>
-          <a:fontRef idx="minor">
-            <a:schemeClr val="lt1"/>
-          </a:fontRef>
-        </p:style>
-        <p:txBody>
-          <a:bodyPr rtlCol="0" anchor="ctr"/>
-          <a:lstStyle/>
-          <a:p>
-            <a:pPr algn="ctr"/>
-            <a:endParaRPr lang="fr-FR"/>
-          </a:p>
-        </p:txBody>
-      </p:sp>
-      <p:pic>
-        <p:nvPicPr>
-          <p:cNvPr id="4" name="Image 3" descr="Une image contenant texte&#10;&#10;Description générée automatiquement">
-            <a:extLst>
-              <a:ext uri="{FF2B5EF4-FFF2-40B4-BE49-F238E27FC236}">
-                <a16:creationId xmlns:a16="http://schemas.microsoft.com/office/drawing/2014/main" id="{7CBF3D4E-10C3-7F66-6D9A-1AEA608A1C04}"/>
-              </a:ext>
-            </a:extLst>
-          </p:cNvPr>
-          <p:cNvPicPr>
-            <a:picLocks noChangeAspect="1"/>
-          </p:cNvPicPr>
-          <p:nvPr/>
-        </p:nvPicPr>
-        <p:blipFill>
-          <a:blip r:embed="rId3" cstate="print">
-            <a:extLst>
-              <a:ext uri="{28A0092B-C50C-407E-A947-70E740481C1C}">
-                <a14:useLocalDpi xmlns:a14="http://schemas.microsoft.com/office/drawing/2010/main" val="0"/>
-              </a:ext>
-            </a:extLst>
-          </a:blip>
-          <a:stretch>
-            <a:fillRect/>
-          </a:stretch>
-        </p:blipFill>
-        <p:spPr>
-          <a:xfrm>
-            <a:off x="9808481" y="509288"/>
-            <a:ext cx="1825291" cy="749808"/>
-          </a:xfrm>
-          <a:prstGeom prst="rect">
-            <a:avLst/>
-          </a:prstGeom>
-        </p:spPr>
-      </p:pic>
-      <p:sp>
-        <p:nvSpPr>
-          <p:cNvPr id="5" name="ZoneTexte 4">
-            <a:extLst>
-              <a:ext uri="{FF2B5EF4-FFF2-40B4-BE49-F238E27FC236}">
-                <a16:creationId xmlns:a16="http://schemas.microsoft.com/office/drawing/2014/main" id="{9CDF11C1-BBA2-B5DF-3B31-3983D95B937E}"/>
-              </a:ext>
-            </a:extLst>
-          </p:cNvPr>
-          <p:cNvSpPr txBox="1"/>
-          <p:nvPr/>
-        </p:nvSpPr>
-        <p:spPr>
-          <a:xfrm>
-            <a:off x="808897" y="2000517"/>
-            <a:ext cx="6096000" cy="1323439"/>
-          </a:xfrm>
-          <a:prstGeom prst="rect">
-            <a:avLst/>
-          </a:prstGeom>
-          <a:solidFill>
-            <a:schemeClr val="bg1">
-              <a:lumMod val="95000"/>
-            </a:schemeClr>
-          </a:solidFill>
-        </p:spPr>
-        <p:txBody>
-          <a:bodyPr wrap="square">
-            <a:spAutoFit/>
-          </a:bodyPr>
-          <a:lstStyle/>
-          <a:p>
-            <a:r>
-              <a:rPr lang="fr-FR" sz="1600" b="1" dirty="0"/>
-              <a:t>class</a:t>
-            </a:r>
-            <a:r>
-              <a:rPr lang="fr-FR" sz="1600" dirty="0"/>
-              <a:t> Point:	</a:t>
-            </a:r>
-          </a:p>
-          <a:p>
-            <a:r>
-              <a:rPr lang="fr-FR" sz="1600" dirty="0"/>
-              <a:t>	</a:t>
-            </a:r>
-            <a:r>
-              <a:rPr lang="fr-FR" sz="1600" b="1" dirty="0" err="1"/>
-              <a:t>def</a:t>
-            </a:r>
-            <a:r>
-              <a:rPr lang="fr-FR" sz="1600" dirty="0"/>
-              <a:t> </a:t>
-            </a:r>
-            <a:r>
-              <a:rPr lang="fr-FR" sz="1600" b="1" i="1" dirty="0"/>
-              <a:t>__init__</a:t>
-            </a:r>
-            <a:r>
-              <a:rPr lang="fr-FR" sz="1600" dirty="0"/>
-              <a:t>(</a:t>
-            </a:r>
-            <a:r>
-              <a:rPr lang="fr-FR" sz="1600" b="1" dirty="0"/>
-              <a:t>self</a:t>
-            </a:r>
-            <a:r>
-              <a:rPr lang="fr-FR" sz="1600" dirty="0"/>
-              <a:t>, </a:t>
-            </a:r>
-            <a:r>
-              <a:rPr lang="fr-FR" sz="1600" dirty="0">
-                <a:solidFill>
-                  <a:schemeClr val="tx1">
-                    <a:lumMod val="65000"/>
-                    <a:lumOff val="35000"/>
-                  </a:schemeClr>
-                </a:solidFill>
-              </a:rPr>
-              <a:t>x</a:t>
-            </a:r>
-            <a:r>
-              <a:rPr lang="fr-FR" sz="1600" dirty="0"/>
-              <a:t>:</a:t>
-            </a:r>
-            <a:r>
-              <a:rPr lang="fr-FR" sz="1600" b="1" i="1" dirty="0"/>
-              <a:t>float</a:t>
-            </a:r>
-            <a:r>
-              <a:rPr lang="fr-FR" sz="1600" dirty="0"/>
-              <a:t>, </a:t>
-            </a:r>
-            <a:r>
-              <a:rPr lang="fr-FR" sz="1600" dirty="0">
-                <a:solidFill>
-                  <a:schemeClr val="tx1">
-                    <a:lumMod val="65000"/>
-                    <a:lumOff val="35000"/>
-                  </a:schemeClr>
-                </a:solidFill>
-              </a:rPr>
-              <a:t>y</a:t>
-            </a:r>
-            <a:r>
-              <a:rPr lang="fr-FR" sz="1600" dirty="0"/>
-              <a:t>:</a:t>
-            </a:r>
-            <a:r>
-              <a:rPr lang="fr-FR" sz="1600" b="1" i="1" dirty="0"/>
-              <a:t>float</a:t>
-            </a:r>
-            <a:r>
-              <a:rPr lang="fr-FR" sz="1600" dirty="0"/>
-              <a:t>, </a:t>
-            </a:r>
-            <a:r>
-              <a:rPr lang="fr-FR" sz="1600" dirty="0" err="1">
-                <a:solidFill>
-                  <a:schemeClr val="tx1">
-                    <a:lumMod val="65000"/>
-                    <a:lumOff val="35000"/>
-                  </a:schemeClr>
-                </a:solidFill>
-              </a:rPr>
-              <a:t>name</a:t>
-            </a:r>
-            <a:r>
-              <a:rPr lang="fr-FR" sz="1600" dirty="0" err="1"/>
-              <a:t>:</a:t>
-            </a:r>
-            <a:r>
-              <a:rPr lang="fr-FR" sz="1600" b="1" i="1" dirty="0" err="1"/>
-              <a:t>str</a:t>
-            </a:r>
-            <a:r>
-              <a:rPr lang="fr-FR" sz="1600" dirty="0"/>
-              <a:t>):</a:t>
-            </a:r>
-          </a:p>
-          <a:p>
-            <a:r>
-              <a:rPr lang="fr-FR" sz="1600" dirty="0"/>
-              <a:t>		</a:t>
-            </a:r>
-            <a:r>
-              <a:rPr lang="fr-FR" sz="1600" b="1" dirty="0" err="1"/>
-              <a:t>self.</a:t>
-            </a:r>
-            <a:r>
-              <a:rPr lang="fr-FR" sz="1600" i="1" dirty="0" err="1"/>
-              <a:t>x</a:t>
-            </a:r>
-            <a:r>
-              <a:rPr lang="fr-FR" sz="1600" dirty="0"/>
-              <a:t> = x</a:t>
-            </a:r>
-            <a:endParaRPr lang="fr-FR" sz="1600" dirty="0">
-              <a:solidFill>
-                <a:schemeClr val="tx1">
-                  <a:lumMod val="65000"/>
-                  <a:lumOff val="35000"/>
-                </a:schemeClr>
-              </a:solidFill>
-            </a:endParaRPr>
-          </a:p>
-          <a:p>
-            <a:r>
-              <a:rPr lang="fr-FR" sz="1600" dirty="0"/>
-              <a:t>		</a:t>
-            </a:r>
-            <a:r>
-              <a:rPr lang="fr-FR" sz="1600" b="1" dirty="0" err="1"/>
-              <a:t>self.</a:t>
-            </a:r>
-            <a:r>
-              <a:rPr lang="fr-FR" sz="1600" i="1" dirty="0" err="1"/>
-              <a:t>y</a:t>
-            </a:r>
-            <a:r>
-              <a:rPr lang="fr-FR" sz="1600" dirty="0"/>
-              <a:t> = </a:t>
-            </a:r>
-            <a:r>
-              <a:rPr lang="fr-FR" sz="1600" dirty="0">
-                <a:solidFill>
-                  <a:schemeClr val="tx1">
-                    <a:lumMod val="65000"/>
-                    <a:lumOff val="35000"/>
-                  </a:schemeClr>
-                </a:solidFill>
-              </a:rPr>
-              <a:t>y</a:t>
-            </a:r>
-          </a:p>
-          <a:p>
-            <a:r>
-              <a:rPr lang="fr-FR" sz="1600" dirty="0"/>
-              <a:t>		</a:t>
-            </a:r>
-            <a:r>
-              <a:rPr lang="fr-FR" sz="1600" b="1" dirty="0"/>
-              <a:t>self.</a:t>
-            </a:r>
-            <a:r>
-              <a:rPr lang="fr-FR" sz="1600" i="1" dirty="0"/>
-              <a:t>name</a:t>
-            </a:r>
-            <a:r>
-              <a:rPr lang="fr-FR" sz="1600" dirty="0"/>
-              <a:t> = </a:t>
-            </a:r>
-            <a:r>
-              <a:rPr lang="fr-FR" sz="1600" dirty="0" err="1"/>
-              <a:t>name</a:t>
-            </a:r>
-            <a:endParaRPr lang="fr-FR" sz="1600" dirty="0">
-              <a:solidFill>
-                <a:schemeClr val="tx1">
-                  <a:lumMod val="65000"/>
-                  <a:lumOff val="35000"/>
-                </a:schemeClr>
-              </a:solidFill>
-            </a:endParaRPr>
-          </a:p>
-        </p:txBody>
-      </p:sp>
-      <p:sp>
-        <p:nvSpPr>
-          <p:cNvPr id="6" name="Rectangle 5">
-            <a:extLst>
-              <a:ext uri="{FF2B5EF4-FFF2-40B4-BE49-F238E27FC236}">
-                <a16:creationId xmlns:a16="http://schemas.microsoft.com/office/drawing/2014/main" id="{1C39149D-4063-CACB-FB81-3A9AF6F1CA41}"/>
-              </a:ext>
-            </a:extLst>
-          </p:cNvPr>
-          <p:cNvSpPr/>
-          <p:nvPr/>
-        </p:nvSpPr>
-        <p:spPr>
-          <a:xfrm>
-            <a:off x="7892115" y="2372921"/>
-            <a:ext cx="3337560" cy="434288"/>
-          </a:xfrm>
-          <a:prstGeom prst="rect">
-            <a:avLst/>
-          </a:prstGeom>
-          <a:solidFill>
-            <a:schemeClr val="accent3">
-              <a:lumMod val="60000"/>
-              <a:lumOff val="40000"/>
-            </a:schemeClr>
-          </a:solidFill>
-          <a:ln w="28575">
-            <a:solidFill>
-              <a:schemeClr val="tx1"/>
-            </a:solidFill>
-          </a:ln>
-        </p:spPr>
-        <p:style>
-          <a:lnRef idx="2">
-            <a:schemeClr val="accent1">
-              <a:shade val="15000"/>
-            </a:schemeClr>
-          </a:lnRef>
-          <a:fillRef idx="1">
-            <a:schemeClr val="accent1"/>
-          </a:fillRef>
-          <a:effectRef idx="0">
-            <a:schemeClr val="accent1"/>
-          </a:effectRef>
-          <a:fontRef idx="minor">
-            <a:schemeClr val="lt1"/>
-          </a:fontRef>
-        </p:style>
-        <p:txBody>
-          <a:bodyPr rtlCol="0" anchor="ctr"/>
-          <a:lstStyle/>
-          <a:p>
-            <a:pPr algn="ctr"/>
-            <a:r>
-              <a:rPr lang="fr-FR" sz="1600" b="1" dirty="0">
-                <a:solidFill>
-                  <a:schemeClr val="tx1"/>
-                </a:solidFill>
-              </a:rPr>
-              <a:t>Point</a:t>
-            </a:r>
-          </a:p>
-        </p:txBody>
-      </p:sp>
-      <p:sp>
-        <p:nvSpPr>
-          <p:cNvPr id="8" name="Rectangle 7">
-            <a:extLst>
-              <a:ext uri="{FF2B5EF4-FFF2-40B4-BE49-F238E27FC236}">
-                <a16:creationId xmlns:a16="http://schemas.microsoft.com/office/drawing/2014/main" id="{A53C3EE2-4A8F-88A1-7F07-8BCA6709DD66}"/>
-              </a:ext>
-            </a:extLst>
-          </p:cNvPr>
-          <p:cNvSpPr/>
-          <p:nvPr/>
-        </p:nvSpPr>
-        <p:spPr>
-          <a:xfrm>
-            <a:off x="7891283" y="2799992"/>
-            <a:ext cx="3337560" cy="993815"/>
-          </a:xfrm>
-          <a:prstGeom prst="rect">
-            <a:avLst/>
-          </a:prstGeom>
-          <a:solidFill>
-            <a:srgbClr val="002060"/>
-          </a:solidFill>
-          <a:ln w="28575">
-            <a:solidFill>
-              <a:schemeClr val="tx1"/>
-            </a:solidFill>
-          </a:ln>
-        </p:spPr>
-        <p:style>
-          <a:lnRef idx="2">
-            <a:schemeClr val="accent1">
-              <a:shade val="15000"/>
-            </a:schemeClr>
-          </a:lnRef>
-          <a:fillRef idx="1">
-            <a:schemeClr val="accent1"/>
-          </a:fillRef>
-          <a:effectRef idx="0">
-            <a:schemeClr val="accent1"/>
-          </a:effectRef>
-          <a:fontRef idx="minor">
-            <a:schemeClr val="lt1"/>
-          </a:fontRef>
-        </p:style>
-        <p:txBody>
-          <a:bodyPr rtlCol="0" anchor="ctr"/>
-          <a:lstStyle/>
-          <a:p>
-            <a:pPr algn="ctr"/>
-            <a:r>
-              <a:rPr lang="fr-FR" sz="1600" b="1" dirty="0">
-                <a:solidFill>
-                  <a:schemeClr val="bg1"/>
-                </a:solidFill>
-              </a:rPr>
-              <a:t>x</a:t>
-            </a:r>
-            <a:r>
-              <a:rPr lang="fr-FR" sz="1600" dirty="0">
-                <a:solidFill>
-                  <a:schemeClr val="bg1"/>
-                </a:solidFill>
-              </a:rPr>
-              <a:t> : </a:t>
-            </a:r>
-            <a:r>
-              <a:rPr lang="fr-FR" sz="1600" dirty="0" err="1">
-                <a:solidFill>
-                  <a:schemeClr val="bg1"/>
-                </a:solidFill>
-              </a:rPr>
-              <a:t>float</a:t>
-            </a:r>
-            <a:r>
-              <a:rPr lang="fr-FR" sz="1600" dirty="0">
-                <a:solidFill>
-                  <a:schemeClr val="bg1"/>
-                </a:solidFill>
-              </a:rPr>
-              <a:t> </a:t>
-            </a:r>
-          </a:p>
-          <a:p>
-            <a:pPr algn="ctr"/>
-            <a:r>
-              <a:rPr lang="fr-FR" sz="1600" b="1" dirty="0">
-                <a:solidFill>
-                  <a:schemeClr val="bg1"/>
-                </a:solidFill>
-              </a:rPr>
-              <a:t>y</a:t>
-            </a:r>
-            <a:r>
-              <a:rPr lang="fr-FR" sz="1600" dirty="0">
-                <a:solidFill>
-                  <a:schemeClr val="bg1"/>
-                </a:solidFill>
-              </a:rPr>
-              <a:t> : </a:t>
-            </a:r>
-            <a:r>
-              <a:rPr lang="fr-FR" sz="1600" dirty="0" err="1">
-                <a:solidFill>
-                  <a:schemeClr val="bg1"/>
-                </a:solidFill>
-              </a:rPr>
-              <a:t>float</a:t>
-            </a:r>
-            <a:r>
-              <a:rPr lang="fr-FR" sz="1600" dirty="0">
-                <a:solidFill>
-                  <a:schemeClr val="bg1"/>
-                </a:solidFill>
-              </a:rPr>
-              <a:t> </a:t>
-            </a:r>
-          </a:p>
-          <a:p>
-            <a:pPr algn="ctr"/>
-            <a:r>
-              <a:rPr lang="fr-FR" sz="1600" b="1" dirty="0" err="1">
-                <a:solidFill>
-                  <a:schemeClr val="bg1"/>
-                </a:solidFill>
-              </a:rPr>
-              <a:t>name</a:t>
-            </a:r>
-            <a:r>
-              <a:rPr lang="fr-FR" sz="1600" dirty="0">
-                <a:solidFill>
-                  <a:schemeClr val="bg1"/>
-                </a:solidFill>
-              </a:rPr>
-              <a:t>: </a:t>
-            </a:r>
-            <a:r>
-              <a:rPr lang="fr-FR" sz="1600" dirty="0" err="1">
-                <a:solidFill>
-                  <a:schemeClr val="bg1"/>
-                </a:solidFill>
-              </a:rPr>
-              <a:t>str</a:t>
-            </a:r>
-            <a:endParaRPr lang="fr-FR" sz="1600" dirty="0">
-              <a:solidFill>
-                <a:schemeClr val="bg1"/>
-              </a:solidFill>
-            </a:endParaRPr>
-          </a:p>
-        </p:txBody>
-      </p:sp>
-      <p:sp>
-        <p:nvSpPr>
-          <p:cNvPr id="10" name="Rectangle 9">
-            <a:extLst>
-              <a:ext uri="{FF2B5EF4-FFF2-40B4-BE49-F238E27FC236}">
-                <a16:creationId xmlns:a16="http://schemas.microsoft.com/office/drawing/2014/main" id="{CC0C45A0-7BE1-FAB8-6564-021AC54FC60C}"/>
-              </a:ext>
-            </a:extLst>
-          </p:cNvPr>
-          <p:cNvSpPr/>
-          <p:nvPr/>
-        </p:nvSpPr>
-        <p:spPr>
-          <a:xfrm>
-            <a:off x="7891283" y="3793807"/>
-            <a:ext cx="3337560" cy="1472521"/>
-          </a:xfrm>
-          <a:prstGeom prst="rect">
-            <a:avLst/>
-          </a:prstGeom>
-          <a:solidFill>
-            <a:srgbClr val="00B0F0"/>
-          </a:solidFill>
-          <a:ln w="28575">
-            <a:solidFill>
-              <a:schemeClr val="tx1"/>
-            </a:solidFill>
-          </a:ln>
-        </p:spPr>
-        <p:style>
-          <a:lnRef idx="2">
-            <a:schemeClr val="accent1">
-              <a:shade val="15000"/>
-            </a:schemeClr>
-          </a:lnRef>
-          <a:fillRef idx="1">
-            <a:schemeClr val="accent1"/>
-          </a:fillRef>
-          <a:effectRef idx="0">
-            <a:schemeClr val="accent1"/>
-          </a:effectRef>
-          <a:fontRef idx="minor">
-            <a:schemeClr val="lt1"/>
-          </a:fontRef>
-        </p:style>
-        <p:txBody>
-          <a:bodyPr rtlCol="0" anchor="ctr"/>
-          <a:lstStyle/>
-          <a:p>
-            <a:pPr algn="ctr"/>
-            <a:r>
-              <a:rPr lang="fr-FR" sz="1600" b="1" dirty="0">
-                <a:solidFill>
-                  <a:schemeClr val="tx1"/>
-                </a:solidFill>
-              </a:rPr>
-              <a:t>__init__</a:t>
-            </a:r>
-            <a:r>
-              <a:rPr lang="fr-FR" sz="1600" dirty="0">
-                <a:solidFill>
-                  <a:schemeClr val="tx1"/>
-                </a:solidFill>
-              </a:rPr>
-              <a:t>(x: </a:t>
-            </a:r>
-            <a:r>
-              <a:rPr lang="fr-FR" sz="1600" dirty="0" err="1">
-                <a:solidFill>
-                  <a:schemeClr val="tx1"/>
-                </a:solidFill>
-              </a:rPr>
-              <a:t>float</a:t>
-            </a:r>
-            <a:r>
-              <a:rPr lang="fr-FR" sz="1600" dirty="0">
-                <a:solidFill>
-                  <a:schemeClr val="tx1"/>
-                </a:solidFill>
-              </a:rPr>
-              <a:t>, y: </a:t>
-            </a:r>
-            <a:r>
-              <a:rPr lang="fr-FR" sz="1600" dirty="0" err="1">
-                <a:solidFill>
-                  <a:schemeClr val="tx1"/>
-                </a:solidFill>
-              </a:rPr>
-              <a:t>float</a:t>
-            </a:r>
-            <a:r>
-              <a:rPr lang="fr-FR" sz="1600" dirty="0">
-                <a:solidFill>
-                  <a:schemeClr val="tx1"/>
-                </a:solidFill>
-              </a:rPr>
-              <a:t>)  </a:t>
-            </a:r>
-          </a:p>
-          <a:p>
-            <a:pPr algn="ctr"/>
-            <a:r>
-              <a:rPr lang="fr-FR" sz="1600" b="1" dirty="0">
-                <a:solidFill>
-                  <a:schemeClr val="tx1"/>
-                </a:solidFill>
-              </a:rPr>
-              <a:t>__</a:t>
-            </a:r>
-            <a:r>
-              <a:rPr lang="fr-FR" sz="1600" b="1" dirty="0" err="1">
-                <a:solidFill>
-                  <a:schemeClr val="tx1"/>
-                </a:solidFill>
-              </a:rPr>
-              <a:t>str</a:t>
-            </a:r>
-            <a:r>
-              <a:rPr lang="fr-FR" sz="1600" b="1" dirty="0">
-                <a:solidFill>
-                  <a:schemeClr val="tx1"/>
-                </a:solidFill>
-              </a:rPr>
-              <a:t>__</a:t>
-            </a:r>
-            <a:r>
-              <a:rPr lang="fr-FR" sz="1600" dirty="0">
-                <a:solidFill>
-                  <a:schemeClr val="tx1"/>
-                </a:solidFill>
-              </a:rPr>
-              <a:t>()</a:t>
-            </a:r>
-          </a:p>
-          <a:p>
-            <a:pPr algn="ctr"/>
-            <a:r>
-              <a:rPr lang="fr-FR" sz="1600" b="1" dirty="0">
-                <a:solidFill>
-                  <a:schemeClr val="tx1"/>
-                </a:solidFill>
-              </a:rPr>
-              <a:t>move(</a:t>
-            </a:r>
-            <a:r>
-              <a:rPr lang="fr-FR" sz="1600" dirty="0">
-                <a:solidFill>
-                  <a:schemeClr val="tx1"/>
-                </a:solidFill>
-              </a:rPr>
-              <a:t>x: </a:t>
-            </a:r>
-            <a:r>
-              <a:rPr lang="fr-FR" sz="1600" dirty="0" err="1">
-                <a:solidFill>
-                  <a:schemeClr val="tx1"/>
-                </a:solidFill>
-              </a:rPr>
-              <a:t>float</a:t>
-            </a:r>
-            <a:r>
-              <a:rPr lang="fr-FR" sz="1600" dirty="0">
-                <a:solidFill>
-                  <a:schemeClr val="tx1"/>
-                </a:solidFill>
-              </a:rPr>
-              <a:t>, y: </a:t>
-            </a:r>
-            <a:r>
-              <a:rPr lang="fr-FR" sz="1600" dirty="0" err="1">
-                <a:solidFill>
-                  <a:schemeClr val="tx1"/>
-                </a:solidFill>
-              </a:rPr>
-              <a:t>float</a:t>
-            </a:r>
-            <a:r>
-              <a:rPr lang="fr-FR" sz="1600" b="1" dirty="0">
-                <a:solidFill>
-                  <a:schemeClr val="tx1"/>
-                </a:solidFill>
-              </a:rPr>
-              <a:t>)</a:t>
-            </a:r>
-            <a:endParaRPr lang="fr-FR" sz="1600" dirty="0">
-              <a:solidFill>
-                <a:schemeClr val="tx1"/>
-              </a:solidFill>
-            </a:endParaRPr>
-          </a:p>
-        </p:txBody>
-      </p:sp>
-      <p:sp>
-        <p:nvSpPr>
-          <p:cNvPr id="11" name="Rectangle 10">
-            <a:extLst>
-              <a:ext uri="{FF2B5EF4-FFF2-40B4-BE49-F238E27FC236}">
-                <a16:creationId xmlns:a16="http://schemas.microsoft.com/office/drawing/2014/main" id="{BDDE8FB6-A91C-9E1A-84E8-B72C4B098D44}"/>
-              </a:ext>
-            </a:extLst>
-          </p:cNvPr>
-          <p:cNvSpPr/>
-          <p:nvPr/>
-        </p:nvSpPr>
-        <p:spPr>
-          <a:xfrm rot="16200000">
-            <a:off x="6795020" y="4402529"/>
-            <a:ext cx="1472520" cy="255073"/>
-          </a:xfrm>
-          <a:prstGeom prst="rect">
-            <a:avLst/>
-          </a:prstGeom>
-          <a:solidFill>
-            <a:srgbClr val="00B0F0"/>
-          </a:solidFill>
-          <a:ln>
-            <a:noFill/>
-          </a:ln>
-        </p:spPr>
-        <p:style>
-          <a:lnRef idx="2">
-            <a:schemeClr val="accent1">
-              <a:shade val="15000"/>
-            </a:schemeClr>
-          </a:lnRef>
-          <a:fillRef idx="1">
-            <a:schemeClr val="accent1"/>
-          </a:fillRef>
-          <a:effectRef idx="0">
-            <a:schemeClr val="accent1"/>
-          </a:effectRef>
-          <a:fontRef idx="minor">
-            <a:schemeClr val="lt1"/>
-          </a:fontRef>
-        </p:style>
-        <p:txBody>
-          <a:bodyPr vert="horz" rtlCol="0" anchor="ctr"/>
-          <a:lstStyle/>
-          <a:p>
-            <a:pPr algn="ctr"/>
-            <a:r>
-              <a:rPr lang="fr-FR" sz="1100" b="1" dirty="0"/>
-              <a:t>COMPORTEMENT</a:t>
-            </a:r>
-          </a:p>
-        </p:txBody>
-      </p:sp>
-      <p:sp>
-        <p:nvSpPr>
-          <p:cNvPr id="14" name="Rectangle 13">
-            <a:extLst>
-              <a:ext uri="{FF2B5EF4-FFF2-40B4-BE49-F238E27FC236}">
-                <a16:creationId xmlns:a16="http://schemas.microsoft.com/office/drawing/2014/main" id="{C082E192-FCAA-1AF2-4415-AB5D636D08BF}"/>
-              </a:ext>
-            </a:extLst>
-          </p:cNvPr>
-          <p:cNvSpPr/>
-          <p:nvPr/>
-        </p:nvSpPr>
-        <p:spPr>
-          <a:xfrm rot="16200000">
-            <a:off x="7034372" y="3169362"/>
-            <a:ext cx="993816" cy="255073"/>
-          </a:xfrm>
-          <a:prstGeom prst="rect">
-            <a:avLst/>
-          </a:prstGeom>
-          <a:solidFill>
-            <a:srgbClr val="002060"/>
-          </a:solidFill>
-          <a:ln>
-            <a:noFill/>
-          </a:ln>
-        </p:spPr>
-        <p:style>
-          <a:lnRef idx="2">
-            <a:schemeClr val="accent1">
-              <a:shade val="15000"/>
-            </a:schemeClr>
-          </a:lnRef>
-          <a:fillRef idx="1">
-            <a:schemeClr val="accent1"/>
-          </a:fillRef>
-          <a:effectRef idx="0">
-            <a:schemeClr val="accent1"/>
-          </a:effectRef>
-          <a:fontRef idx="minor">
-            <a:schemeClr val="lt1"/>
-          </a:fontRef>
-        </p:style>
-        <p:txBody>
-          <a:bodyPr vert="horz" rtlCol="0" anchor="ctr"/>
-          <a:lstStyle/>
-          <a:p>
-            <a:pPr algn="ctr"/>
-            <a:r>
-              <a:rPr lang="fr-FR" sz="1200" b="1" dirty="0"/>
-              <a:t>ETAT</a:t>
-            </a:r>
-          </a:p>
-        </p:txBody>
-      </p:sp>
-      <p:sp>
-        <p:nvSpPr>
-          <p:cNvPr id="12" name="ZoneTexte 11">
-            <a:extLst>
-              <a:ext uri="{FF2B5EF4-FFF2-40B4-BE49-F238E27FC236}">
-                <a16:creationId xmlns:a16="http://schemas.microsoft.com/office/drawing/2014/main" id="{456F1402-761F-D699-4A1A-81BE4C518AB3}"/>
-              </a:ext>
-            </a:extLst>
-          </p:cNvPr>
-          <p:cNvSpPr txBox="1"/>
-          <p:nvPr/>
-        </p:nvSpPr>
-        <p:spPr>
-          <a:xfrm>
-            <a:off x="808897" y="3506323"/>
-            <a:ext cx="6096000" cy="338554"/>
-          </a:xfrm>
-          <a:prstGeom prst="rect">
-            <a:avLst/>
-          </a:prstGeom>
-          <a:solidFill>
-            <a:schemeClr val="bg1">
-              <a:lumMod val="85000"/>
-            </a:schemeClr>
-          </a:solidFill>
-        </p:spPr>
-        <p:txBody>
-          <a:bodyPr wrap="square">
-            <a:spAutoFit/>
-          </a:bodyPr>
-          <a:lstStyle/>
-          <a:p>
-            <a:r>
-              <a:rPr lang="en-US" sz="1600" dirty="0" err="1">
-                <a:highlight>
-                  <a:srgbClr val="D6B4B2"/>
-                </a:highlight>
-              </a:rPr>
-              <a:t>pointA</a:t>
-            </a:r>
-            <a:r>
-              <a:rPr lang="fr-FR" sz="1600" dirty="0"/>
-              <a:t> </a:t>
-            </a:r>
-            <a:r>
-              <a:rPr lang="fr-FR" sz="1600" b="1" dirty="0"/>
-              <a:t>=</a:t>
-            </a:r>
-            <a:r>
-              <a:rPr lang="fr-FR" sz="1600" dirty="0"/>
-              <a:t> Point(-0.5, 5.5, ‘A’)</a:t>
-            </a:r>
-          </a:p>
-        </p:txBody>
-      </p:sp>
-    </p:spTree>
-    <p:extLst>
-      <p:ext uri="{BB962C8B-B14F-4D97-AF65-F5344CB8AC3E}">
-        <p14:creationId xmlns:p14="http://schemas.microsoft.com/office/powerpoint/2010/main" val="2767806304"/>
       </p:ext>
     </p:extLst>
   </p:cSld>
@@ -33990,7 +33801,7 @@
         <p:cNvPr id="1" name="">
           <a:extLst>
             <a:ext uri="{FF2B5EF4-FFF2-40B4-BE49-F238E27FC236}">
-              <a16:creationId xmlns:a16="http://schemas.microsoft.com/office/drawing/2014/main" id="{8CE50980-3F53-493E-B255-288159095AFF}"/>
+              <a16:creationId xmlns:a16="http://schemas.microsoft.com/office/drawing/2014/main" id="{9A54251C-96BC-3BDA-5221-A4EAF4CB9E7E}"/>
             </a:ext>
           </a:extLst>
         </p:cNvPr>
@@ -34010,7 +33821,7 @@
           <p:cNvPr id="3" name="Rectangle 2">
             <a:extLst>
               <a:ext uri="{FF2B5EF4-FFF2-40B4-BE49-F238E27FC236}">
-                <a16:creationId xmlns:a16="http://schemas.microsoft.com/office/drawing/2014/main" id="{FDEA1EC8-02B6-73F9-A3A6-23F088C48204}"/>
+                <a16:creationId xmlns:a16="http://schemas.microsoft.com/office/drawing/2014/main" id="{41A30C78-275B-09F5-38D0-3F2B63785CE5}"/>
               </a:ext>
             </a:extLst>
           </p:cNvPr>
@@ -34073,7 +33884,7 @@
           <p:cNvPr id="2" name="Titre 1">
             <a:extLst>
               <a:ext uri="{FF2B5EF4-FFF2-40B4-BE49-F238E27FC236}">
-                <a16:creationId xmlns:a16="http://schemas.microsoft.com/office/drawing/2014/main" id="{542F0D4E-34BF-956E-F157-ACD4929EE3CD}"/>
+                <a16:creationId xmlns:a16="http://schemas.microsoft.com/office/drawing/2014/main" id="{E7C445E5-30AE-1ADD-7E4C-B45E6A9B1DEE}"/>
               </a:ext>
             </a:extLst>
           </p:cNvPr>
@@ -34127,6 +33938,1047 @@
           <p:cNvPr id="7" name="Rectangle 6">
             <a:extLst>
               <a:ext uri="{FF2B5EF4-FFF2-40B4-BE49-F238E27FC236}">
+                <a16:creationId xmlns:a16="http://schemas.microsoft.com/office/drawing/2014/main" id="{7236EF15-D614-55ED-99E3-280AFCC1953E}"/>
+              </a:ext>
+            </a:extLst>
+          </p:cNvPr>
+          <p:cNvSpPr/>
+          <p:nvPr/>
+        </p:nvSpPr>
+        <p:spPr>
+          <a:xfrm>
+            <a:off x="619125" y="500258"/>
+            <a:ext cx="124142" cy="749808"/>
+          </a:xfrm>
+          <a:prstGeom prst="rect">
+            <a:avLst/>
+          </a:prstGeom>
+          <a:solidFill>
+            <a:srgbClr val="002060"/>
+          </a:solidFill>
+          <a:ln>
+            <a:noFill/>
+          </a:ln>
+        </p:spPr>
+        <p:style>
+          <a:lnRef idx="2">
+            <a:schemeClr val="accent1">
+              <a:shade val="15000"/>
+            </a:schemeClr>
+          </a:lnRef>
+          <a:fillRef idx="1">
+            <a:schemeClr val="accent1"/>
+          </a:fillRef>
+          <a:effectRef idx="0">
+            <a:schemeClr val="accent1"/>
+          </a:effectRef>
+          <a:fontRef idx="minor">
+            <a:schemeClr val="lt1"/>
+          </a:fontRef>
+        </p:style>
+        <p:txBody>
+          <a:bodyPr rtlCol="0" anchor="ctr"/>
+          <a:lstStyle/>
+          <a:p>
+            <a:pPr algn="ctr"/>
+            <a:endParaRPr lang="fr-FR"/>
+          </a:p>
+        </p:txBody>
+      </p:sp>
+      <p:pic>
+        <p:nvPicPr>
+          <p:cNvPr id="4" name="Image 3" descr="Une image contenant texte&#10;&#10;Description générée automatiquement">
+            <a:extLst>
+              <a:ext uri="{FF2B5EF4-FFF2-40B4-BE49-F238E27FC236}">
+                <a16:creationId xmlns:a16="http://schemas.microsoft.com/office/drawing/2014/main" id="{7CBF3D4E-10C3-7F66-6D9A-1AEA608A1C04}"/>
+              </a:ext>
+            </a:extLst>
+          </p:cNvPr>
+          <p:cNvPicPr>
+            <a:picLocks noChangeAspect="1"/>
+          </p:cNvPicPr>
+          <p:nvPr/>
+        </p:nvPicPr>
+        <p:blipFill>
+          <a:blip r:embed="rId3" cstate="print">
+            <a:extLst>
+              <a:ext uri="{28A0092B-C50C-407E-A947-70E740481C1C}">
+                <a14:useLocalDpi xmlns:a14="http://schemas.microsoft.com/office/drawing/2010/main" val="0"/>
+              </a:ext>
+            </a:extLst>
+          </a:blip>
+          <a:stretch>
+            <a:fillRect/>
+          </a:stretch>
+        </p:blipFill>
+        <p:spPr>
+          <a:xfrm>
+            <a:off x="9808481" y="509288"/>
+            <a:ext cx="1825291" cy="749808"/>
+          </a:xfrm>
+          <a:prstGeom prst="rect">
+            <a:avLst/>
+          </a:prstGeom>
+        </p:spPr>
+      </p:pic>
+      <p:sp>
+        <p:nvSpPr>
+          <p:cNvPr id="5" name="ZoneTexte 4">
+            <a:extLst>
+              <a:ext uri="{FF2B5EF4-FFF2-40B4-BE49-F238E27FC236}">
+                <a16:creationId xmlns:a16="http://schemas.microsoft.com/office/drawing/2014/main" id="{9CDF11C1-BBA2-B5DF-3B31-3983D95B937E}"/>
+              </a:ext>
+            </a:extLst>
+          </p:cNvPr>
+          <p:cNvSpPr txBox="1"/>
+          <p:nvPr/>
+        </p:nvSpPr>
+        <p:spPr>
+          <a:xfrm>
+            <a:off x="808897" y="2000517"/>
+            <a:ext cx="6096000" cy="1323439"/>
+          </a:xfrm>
+          <a:prstGeom prst="rect">
+            <a:avLst/>
+          </a:prstGeom>
+          <a:solidFill>
+            <a:schemeClr val="bg1">
+              <a:lumMod val="95000"/>
+            </a:schemeClr>
+          </a:solidFill>
+        </p:spPr>
+        <p:txBody>
+          <a:bodyPr wrap="square">
+            <a:spAutoFit/>
+          </a:bodyPr>
+          <a:lstStyle/>
+          <a:p>
+            <a:r>
+              <a:rPr lang="fr-FR" sz="1600" b="1" dirty="0"/>
+              <a:t>class</a:t>
+            </a:r>
+            <a:r>
+              <a:rPr lang="fr-FR" sz="1600" dirty="0"/>
+              <a:t> Point:	</a:t>
+            </a:r>
+          </a:p>
+          <a:p>
+            <a:r>
+              <a:rPr lang="fr-FR" sz="1600" dirty="0"/>
+              <a:t>	</a:t>
+            </a:r>
+            <a:r>
+              <a:rPr lang="fr-FR" sz="1600" b="1" dirty="0" err="1"/>
+              <a:t>def</a:t>
+            </a:r>
+            <a:r>
+              <a:rPr lang="fr-FR" sz="1600" dirty="0"/>
+              <a:t> </a:t>
+            </a:r>
+            <a:r>
+              <a:rPr lang="fr-FR" sz="1600" b="1" i="1" dirty="0"/>
+              <a:t>__init__</a:t>
+            </a:r>
+            <a:r>
+              <a:rPr lang="fr-FR" sz="1600" dirty="0"/>
+              <a:t>(</a:t>
+            </a:r>
+            <a:r>
+              <a:rPr lang="fr-FR" sz="1600" b="1" dirty="0"/>
+              <a:t>self</a:t>
+            </a:r>
+            <a:r>
+              <a:rPr lang="fr-FR" sz="1600" dirty="0"/>
+              <a:t>, </a:t>
+            </a:r>
+            <a:r>
+              <a:rPr lang="fr-FR" sz="1600" dirty="0">
+                <a:solidFill>
+                  <a:schemeClr val="tx1">
+                    <a:lumMod val="65000"/>
+                    <a:lumOff val="35000"/>
+                  </a:schemeClr>
+                </a:solidFill>
+              </a:rPr>
+              <a:t>x</a:t>
+            </a:r>
+            <a:r>
+              <a:rPr lang="fr-FR" sz="1600" dirty="0"/>
+              <a:t>:</a:t>
+            </a:r>
+            <a:r>
+              <a:rPr lang="fr-FR" sz="1600" b="1" i="1" dirty="0"/>
+              <a:t>float</a:t>
+            </a:r>
+            <a:r>
+              <a:rPr lang="fr-FR" sz="1600" dirty="0"/>
+              <a:t>, </a:t>
+            </a:r>
+            <a:r>
+              <a:rPr lang="fr-FR" sz="1600" dirty="0">
+                <a:solidFill>
+                  <a:schemeClr val="tx1">
+                    <a:lumMod val="65000"/>
+                    <a:lumOff val="35000"/>
+                  </a:schemeClr>
+                </a:solidFill>
+              </a:rPr>
+              <a:t>y</a:t>
+            </a:r>
+            <a:r>
+              <a:rPr lang="fr-FR" sz="1600" dirty="0"/>
+              <a:t>:</a:t>
+            </a:r>
+            <a:r>
+              <a:rPr lang="fr-FR" sz="1600" b="1" i="1" dirty="0"/>
+              <a:t>float</a:t>
+            </a:r>
+            <a:r>
+              <a:rPr lang="fr-FR" sz="1600" dirty="0"/>
+              <a:t>, </a:t>
+            </a:r>
+            <a:r>
+              <a:rPr lang="fr-FR" sz="1600" dirty="0" err="1">
+                <a:solidFill>
+                  <a:schemeClr val="tx1">
+                    <a:lumMod val="65000"/>
+                    <a:lumOff val="35000"/>
+                  </a:schemeClr>
+                </a:solidFill>
+              </a:rPr>
+              <a:t>name</a:t>
+            </a:r>
+            <a:r>
+              <a:rPr lang="fr-FR" sz="1600" dirty="0" err="1"/>
+              <a:t>:</a:t>
+            </a:r>
+            <a:r>
+              <a:rPr lang="fr-FR" sz="1600" b="1" i="1" dirty="0" err="1"/>
+              <a:t>str</a:t>
+            </a:r>
+            <a:r>
+              <a:rPr lang="fr-FR" sz="1600" dirty="0"/>
+              <a:t>):</a:t>
+            </a:r>
+          </a:p>
+          <a:p>
+            <a:r>
+              <a:rPr lang="fr-FR" sz="1600" dirty="0"/>
+              <a:t>		</a:t>
+            </a:r>
+            <a:r>
+              <a:rPr lang="fr-FR" sz="1600" b="1" dirty="0" err="1"/>
+              <a:t>self.</a:t>
+            </a:r>
+            <a:r>
+              <a:rPr lang="fr-FR" sz="1600" i="1" dirty="0" err="1"/>
+              <a:t>x</a:t>
+            </a:r>
+            <a:r>
+              <a:rPr lang="fr-FR" sz="1600" dirty="0"/>
+              <a:t> = x</a:t>
+            </a:r>
+            <a:endParaRPr lang="fr-FR" sz="1600" dirty="0">
+              <a:solidFill>
+                <a:schemeClr val="tx1">
+                  <a:lumMod val="65000"/>
+                  <a:lumOff val="35000"/>
+                </a:schemeClr>
+              </a:solidFill>
+            </a:endParaRPr>
+          </a:p>
+          <a:p>
+            <a:r>
+              <a:rPr lang="fr-FR" sz="1600" dirty="0"/>
+              <a:t>		</a:t>
+            </a:r>
+            <a:r>
+              <a:rPr lang="fr-FR" sz="1600" b="1" dirty="0" err="1"/>
+              <a:t>self.</a:t>
+            </a:r>
+            <a:r>
+              <a:rPr lang="fr-FR" sz="1600" i="1" dirty="0" err="1"/>
+              <a:t>y</a:t>
+            </a:r>
+            <a:r>
+              <a:rPr lang="fr-FR" sz="1600" dirty="0"/>
+              <a:t> = </a:t>
+            </a:r>
+            <a:r>
+              <a:rPr lang="fr-FR" sz="1600" dirty="0">
+                <a:solidFill>
+                  <a:schemeClr val="tx1">
+                    <a:lumMod val="65000"/>
+                    <a:lumOff val="35000"/>
+                  </a:schemeClr>
+                </a:solidFill>
+              </a:rPr>
+              <a:t>y</a:t>
+            </a:r>
+          </a:p>
+          <a:p>
+            <a:r>
+              <a:rPr lang="fr-FR" sz="1600" dirty="0"/>
+              <a:t>		</a:t>
+            </a:r>
+            <a:r>
+              <a:rPr lang="fr-FR" sz="1600" b="1" dirty="0"/>
+              <a:t>self.</a:t>
+            </a:r>
+            <a:r>
+              <a:rPr lang="fr-FR" sz="1600" i="1" dirty="0"/>
+              <a:t>name</a:t>
+            </a:r>
+            <a:r>
+              <a:rPr lang="fr-FR" sz="1600" dirty="0"/>
+              <a:t> = </a:t>
+            </a:r>
+            <a:r>
+              <a:rPr lang="fr-FR" sz="1600" dirty="0" err="1"/>
+              <a:t>name</a:t>
+            </a:r>
+            <a:endParaRPr lang="fr-FR" sz="1600" dirty="0">
+              <a:solidFill>
+                <a:schemeClr val="tx1">
+                  <a:lumMod val="65000"/>
+                  <a:lumOff val="35000"/>
+                </a:schemeClr>
+              </a:solidFill>
+            </a:endParaRPr>
+          </a:p>
+        </p:txBody>
+      </p:sp>
+      <p:sp>
+        <p:nvSpPr>
+          <p:cNvPr id="6" name="Rectangle 5">
+            <a:extLst>
+              <a:ext uri="{FF2B5EF4-FFF2-40B4-BE49-F238E27FC236}">
+                <a16:creationId xmlns:a16="http://schemas.microsoft.com/office/drawing/2014/main" id="{1C39149D-4063-CACB-FB81-3A9AF6F1CA41}"/>
+              </a:ext>
+            </a:extLst>
+          </p:cNvPr>
+          <p:cNvSpPr/>
+          <p:nvPr/>
+        </p:nvSpPr>
+        <p:spPr>
+          <a:xfrm>
+            <a:off x="7892115" y="2372921"/>
+            <a:ext cx="3337560" cy="434288"/>
+          </a:xfrm>
+          <a:prstGeom prst="rect">
+            <a:avLst/>
+          </a:prstGeom>
+          <a:solidFill>
+            <a:schemeClr val="accent3">
+              <a:lumMod val="60000"/>
+              <a:lumOff val="40000"/>
+            </a:schemeClr>
+          </a:solidFill>
+          <a:ln w="28575">
+            <a:solidFill>
+              <a:schemeClr val="tx1"/>
+            </a:solidFill>
+          </a:ln>
+        </p:spPr>
+        <p:style>
+          <a:lnRef idx="2">
+            <a:schemeClr val="accent1">
+              <a:shade val="15000"/>
+            </a:schemeClr>
+          </a:lnRef>
+          <a:fillRef idx="1">
+            <a:schemeClr val="accent1"/>
+          </a:fillRef>
+          <a:effectRef idx="0">
+            <a:schemeClr val="accent1"/>
+          </a:effectRef>
+          <a:fontRef idx="minor">
+            <a:schemeClr val="lt1"/>
+          </a:fontRef>
+        </p:style>
+        <p:txBody>
+          <a:bodyPr rtlCol="0" anchor="ctr"/>
+          <a:lstStyle/>
+          <a:p>
+            <a:pPr algn="ctr"/>
+            <a:r>
+              <a:rPr lang="fr-FR" sz="1600" b="1" dirty="0">
+                <a:solidFill>
+                  <a:schemeClr val="tx1"/>
+                </a:solidFill>
+              </a:rPr>
+              <a:t>Point</a:t>
+            </a:r>
+          </a:p>
+        </p:txBody>
+      </p:sp>
+      <p:sp>
+        <p:nvSpPr>
+          <p:cNvPr id="8" name="Rectangle 7">
+            <a:extLst>
+              <a:ext uri="{FF2B5EF4-FFF2-40B4-BE49-F238E27FC236}">
+                <a16:creationId xmlns:a16="http://schemas.microsoft.com/office/drawing/2014/main" id="{A53C3EE2-4A8F-88A1-7F07-8BCA6709DD66}"/>
+              </a:ext>
+            </a:extLst>
+          </p:cNvPr>
+          <p:cNvSpPr/>
+          <p:nvPr/>
+        </p:nvSpPr>
+        <p:spPr>
+          <a:xfrm>
+            <a:off x="7891283" y="2799992"/>
+            <a:ext cx="3337560" cy="993815"/>
+          </a:xfrm>
+          <a:prstGeom prst="rect">
+            <a:avLst/>
+          </a:prstGeom>
+          <a:solidFill>
+            <a:srgbClr val="002060"/>
+          </a:solidFill>
+          <a:ln w="28575">
+            <a:solidFill>
+              <a:schemeClr val="tx1"/>
+            </a:solidFill>
+          </a:ln>
+        </p:spPr>
+        <p:style>
+          <a:lnRef idx="2">
+            <a:schemeClr val="accent1">
+              <a:shade val="15000"/>
+            </a:schemeClr>
+          </a:lnRef>
+          <a:fillRef idx="1">
+            <a:schemeClr val="accent1"/>
+          </a:fillRef>
+          <a:effectRef idx="0">
+            <a:schemeClr val="accent1"/>
+          </a:effectRef>
+          <a:fontRef idx="minor">
+            <a:schemeClr val="lt1"/>
+          </a:fontRef>
+        </p:style>
+        <p:txBody>
+          <a:bodyPr rtlCol="0" anchor="ctr"/>
+          <a:lstStyle/>
+          <a:p>
+            <a:pPr algn="ctr"/>
+            <a:r>
+              <a:rPr lang="fr-FR" sz="1600" b="1" dirty="0">
+                <a:solidFill>
+                  <a:schemeClr val="bg1"/>
+                </a:solidFill>
+              </a:rPr>
+              <a:t>x</a:t>
+            </a:r>
+            <a:r>
+              <a:rPr lang="fr-FR" sz="1600" dirty="0">
+                <a:solidFill>
+                  <a:schemeClr val="bg1"/>
+                </a:solidFill>
+              </a:rPr>
+              <a:t> : </a:t>
+            </a:r>
+            <a:r>
+              <a:rPr lang="fr-FR" sz="1600" dirty="0" err="1">
+                <a:solidFill>
+                  <a:schemeClr val="bg1"/>
+                </a:solidFill>
+              </a:rPr>
+              <a:t>float</a:t>
+            </a:r>
+            <a:r>
+              <a:rPr lang="fr-FR" sz="1600" dirty="0">
+                <a:solidFill>
+                  <a:schemeClr val="bg1"/>
+                </a:solidFill>
+              </a:rPr>
+              <a:t> </a:t>
+            </a:r>
+          </a:p>
+          <a:p>
+            <a:pPr algn="ctr"/>
+            <a:r>
+              <a:rPr lang="fr-FR" sz="1600" b="1" dirty="0">
+                <a:solidFill>
+                  <a:schemeClr val="bg1"/>
+                </a:solidFill>
+              </a:rPr>
+              <a:t>y</a:t>
+            </a:r>
+            <a:r>
+              <a:rPr lang="fr-FR" sz="1600" dirty="0">
+                <a:solidFill>
+                  <a:schemeClr val="bg1"/>
+                </a:solidFill>
+              </a:rPr>
+              <a:t> : </a:t>
+            </a:r>
+            <a:r>
+              <a:rPr lang="fr-FR" sz="1600" dirty="0" err="1">
+                <a:solidFill>
+                  <a:schemeClr val="bg1"/>
+                </a:solidFill>
+              </a:rPr>
+              <a:t>float</a:t>
+            </a:r>
+            <a:r>
+              <a:rPr lang="fr-FR" sz="1600" dirty="0">
+                <a:solidFill>
+                  <a:schemeClr val="bg1"/>
+                </a:solidFill>
+              </a:rPr>
+              <a:t> </a:t>
+            </a:r>
+          </a:p>
+          <a:p>
+            <a:pPr algn="ctr"/>
+            <a:r>
+              <a:rPr lang="fr-FR" sz="1600" b="1" dirty="0" err="1">
+                <a:solidFill>
+                  <a:schemeClr val="bg1"/>
+                </a:solidFill>
+              </a:rPr>
+              <a:t>name</a:t>
+            </a:r>
+            <a:r>
+              <a:rPr lang="fr-FR" sz="1600" dirty="0">
+                <a:solidFill>
+                  <a:schemeClr val="bg1"/>
+                </a:solidFill>
+              </a:rPr>
+              <a:t>: </a:t>
+            </a:r>
+            <a:r>
+              <a:rPr lang="fr-FR" sz="1600" dirty="0" err="1">
+                <a:solidFill>
+                  <a:schemeClr val="bg1"/>
+                </a:solidFill>
+              </a:rPr>
+              <a:t>str</a:t>
+            </a:r>
+            <a:endParaRPr lang="fr-FR" sz="1600" dirty="0">
+              <a:solidFill>
+                <a:schemeClr val="bg1"/>
+              </a:solidFill>
+            </a:endParaRPr>
+          </a:p>
+        </p:txBody>
+      </p:sp>
+      <p:sp>
+        <p:nvSpPr>
+          <p:cNvPr id="10" name="Rectangle 9">
+            <a:extLst>
+              <a:ext uri="{FF2B5EF4-FFF2-40B4-BE49-F238E27FC236}">
+                <a16:creationId xmlns:a16="http://schemas.microsoft.com/office/drawing/2014/main" id="{CC0C45A0-7BE1-FAB8-6564-021AC54FC60C}"/>
+              </a:ext>
+            </a:extLst>
+          </p:cNvPr>
+          <p:cNvSpPr/>
+          <p:nvPr/>
+        </p:nvSpPr>
+        <p:spPr>
+          <a:xfrm>
+            <a:off x="7891283" y="3793807"/>
+            <a:ext cx="3337560" cy="1472521"/>
+          </a:xfrm>
+          <a:prstGeom prst="rect">
+            <a:avLst/>
+          </a:prstGeom>
+          <a:solidFill>
+            <a:srgbClr val="00B0F0"/>
+          </a:solidFill>
+          <a:ln w="28575">
+            <a:solidFill>
+              <a:schemeClr val="tx1"/>
+            </a:solidFill>
+          </a:ln>
+        </p:spPr>
+        <p:style>
+          <a:lnRef idx="2">
+            <a:schemeClr val="accent1">
+              <a:shade val="15000"/>
+            </a:schemeClr>
+          </a:lnRef>
+          <a:fillRef idx="1">
+            <a:schemeClr val="accent1"/>
+          </a:fillRef>
+          <a:effectRef idx="0">
+            <a:schemeClr val="accent1"/>
+          </a:effectRef>
+          <a:fontRef idx="minor">
+            <a:schemeClr val="lt1"/>
+          </a:fontRef>
+        </p:style>
+        <p:txBody>
+          <a:bodyPr rtlCol="0" anchor="ctr"/>
+          <a:lstStyle/>
+          <a:p>
+            <a:pPr algn="ctr"/>
+            <a:r>
+              <a:rPr lang="fr-FR" sz="1600" b="1" dirty="0">
+                <a:solidFill>
+                  <a:schemeClr val="tx1"/>
+                </a:solidFill>
+              </a:rPr>
+              <a:t>__init__</a:t>
+            </a:r>
+            <a:r>
+              <a:rPr lang="fr-FR" sz="1600" dirty="0">
+                <a:solidFill>
+                  <a:schemeClr val="tx1"/>
+                </a:solidFill>
+              </a:rPr>
+              <a:t>(x: </a:t>
+            </a:r>
+            <a:r>
+              <a:rPr lang="fr-FR" sz="1600" dirty="0" err="1">
+                <a:solidFill>
+                  <a:schemeClr val="tx1"/>
+                </a:solidFill>
+              </a:rPr>
+              <a:t>float</a:t>
+            </a:r>
+            <a:r>
+              <a:rPr lang="fr-FR" sz="1600" dirty="0">
+                <a:solidFill>
+                  <a:schemeClr val="tx1"/>
+                </a:solidFill>
+              </a:rPr>
+              <a:t>, y: </a:t>
+            </a:r>
+            <a:r>
+              <a:rPr lang="fr-FR" sz="1600" dirty="0" err="1">
+                <a:solidFill>
+                  <a:schemeClr val="tx1"/>
+                </a:solidFill>
+              </a:rPr>
+              <a:t>float</a:t>
+            </a:r>
+            <a:r>
+              <a:rPr lang="fr-FR" sz="1600" dirty="0">
+                <a:solidFill>
+                  <a:schemeClr val="tx1"/>
+                </a:solidFill>
+              </a:rPr>
+              <a:t>)  </a:t>
+            </a:r>
+          </a:p>
+          <a:p>
+            <a:pPr algn="ctr"/>
+            <a:r>
+              <a:rPr lang="fr-FR" sz="1600" b="1" dirty="0">
+                <a:solidFill>
+                  <a:schemeClr val="tx1"/>
+                </a:solidFill>
+              </a:rPr>
+              <a:t>__</a:t>
+            </a:r>
+            <a:r>
+              <a:rPr lang="fr-FR" sz="1600" b="1" dirty="0" err="1">
+                <a:solidFill>
+                  <a:schemeClr val="tx1"/>
+                </a:solidFill>
+              </a:rPr>
+              <a:t>str</a:t>
+            </a:r>
+            <a:r>
+              <a:rPr lang="fr-FR" sz="1600" b="1" dirty="0">
+                <a:solidFill>
+                  <a:schemeClr val="tx1"/>
+                </a:solidFill>
+              </a:rPr>
+              <a:t>__</a:t>
+            </a:r>
+            <a:r>
+              <a:rPr lang="fr-FR" sz="1600" dirty="0">
+                <a:solidFill>
+                  <a:schemeClr val="tx1"/>
+                </a:solidFill>
+              </a:rPr>
+              <a:t>()</a:t>
+            </a:r>
+          </a:p>
+          <a:p>
+            <a:pPr algn="ctr"/>
+            <a:r>
+              <a:rPr lang="fr-FR" sz="1600" b="1" dirty="0">
+                <a:solidFill>
+                  <a:schemeClr val="tx1"/>
+                </a:solidFill>
+              </a:rPr>
+              <a:t>move(</a:t>
+            </a:r>
+            <a:r>
+              <a:rPr lang="fr-FR" sz="1600" dirty="0">
+                <a:solidFill>
+                  <a:schemeClr val="tx1"/>
+                </a:solidFill>
+              </a:rPr>
+              <a:t>x: </a:t>
+            </a:r>
+            <a:r>
+              <a:rPr lang="fr-FR" sz="1600" dirty="0" err="1">
+                <a:solidFill>
+                  <a:schemeClr val="tx1"/>
+                </a:solidFill>
+              </a:rPr>
+              <a:t>float</a:t>
+            </a:r>
+            <a:r>
+              <a:rPr lang="fr-FR" sz="1600" dirty="0">
+                <a:solidFill>
+                  <a:schemeClr val="tx1"/>
+                </a:solidFill>
+              </a:rPr>
+              <a:t>, y: </a:t>
+            </a:r>
+            <a:r>
+              <a:rPr lang="fr-FR" sz="1600" dirty="0" err="1">
+                <a:solidFill>
+                  <a:schemeClr val="tx1"/>
+                </a:solidFill>
+              </a:rPr>
+              <a:t>float</a:t>
+            </a:r>
+            <a:r>
+              <a:rPr lang="fr-FR" sz="1600" b="1" dirty="0">
+                <a:solidFill>
+                  <a:schemeClr val="tx1"/>
+                </a:solidFill>
+              </a:rPr>
+              <a:t>)</a:t>
+            </a:r>
+            <a:endParaRPr lang="fr-FR" sz="1600" dirty="0">
+              <a:solidFill>
+                <a:schemeClr val="tx1"/>
+              </a:solidFill>
+            </a:endParaRPr>
+          </a:p>
+        </p:txBody>
+      </p:sp>
+      <p:sp>
+        <p:nvSpPr>
+          <p:cNvPr id="11" name="Rectangle 10">
+            <a:extLst>
+              <a:ext uri="{FF2B5EF4-FFF2-40B4-BE49-F238E27FC236}">
+                <a16:creationId xmlns:a16="http://schemas.microsoft.com/office/drawing/2014/main" id="{BDDE8FB6-A91C-9E1A-84E8-B72C4B098D44}"/>
+              </a:ext>
+            </a:extLst>
+          </p:cNvPr>
+          <p:cNvSpPr/>
+          <p:nvPr/>
+        </p:nvSpPr>
+        <p:spPr>
+          <a:xfrm rot="16200000">
+            <a:off x="6795020" y="4402529"/>
+            <a:ext cx="1472520" cy="255073"/>
+          </a:xfrm>
+          <a:prstGeom prst="rect">
+            <a:avLst/>
+          </a:prstGeom>
+          <a:solidFill>
+            <a:srgbClr val="00B0F0"/>
+          </a:solidFill>
+          <a:ln>
+            <a:noFill/>
+          </a:ln>
+        </p:spPr>
+        <p:style>
+          <a:lnRef idx="2">
+            <a:schemeClr val="accent1">
+              <a:shade val="15000"/>
+            </a:schemeClr>
+          </a:lnRef>
+          <a:fillRef idx="1">
+            <a:schemeClr val="accent1"/>
+          </a:fillRef>
+          <a:effectRef idx="0">
+            <a:schemeClr val="accent1"/>
+          </a:effectRef>
+          <a:fontRef idx="minor">
+            <a:schemeClr val="lt1"/>
+          </a:fontRef>
+        </p:style>
+        <p:txBody>
+          <a:bodyPr vert="horz" rtlCol="0" anchor="ctr"/>
+          <a:lstStyle/>
+          <a:p>
+            <a:pPr algn="ctr"/>
+            <a:r>
+              <a:rPr lang="fr-FR" sz="1100" b="1" dirty="0"/>
+              <a:t>COMPORTEMENT</a:t>
+            </a:r>
+          </a:p>
+        </p:txBody>
+      </p:sp>
+      <p:sp>
+        <p:nvSpPr>
+          <p:cNvPr id="14" name="Rectangle 13">
+            <a:extLst>
+              <a:ext uri="{FF2B5EF4-FFF2-40B4-BE49-F238E27FC236}">
+                <a16:creationId xmlns:a16="http://schemas.microsoft.com/office/drawing/2014/main" id="{C082E192-FCAA-1AF2-4415-AB5D636D08BF}"/>
+              </a:ext>
+            </a:extLst>
+          </p:cNvPr>
+          <p:cNvSpPr/>
+          <p:nvPr/>
+        </p:nvSpPr>
+        <p:spPr>
+          <a:xfrm rot="16200000">
+            <a:off x="7034372" y="3169362"/>
+            <a:ext cx="993816" cy="255073"/>
+          </a:xfrm>
+          <a:prstGeom prst="rect">
+            <a:avLst/>
+          </a:prstGeom>
+          <a:solidFill>
+            <a:srgbClr val="002060"/>
+          </a:solidFill>
+          <a:ln>
+            <a:noFill/>
+          </a:ln>
+        </p:spPr>
+        <p:style>
+          <a:lnRef idx="2">
+            <a:schemeClr val="accent1">
+              <a:shade val="15000"/>
+            </a:schemeClr>
+          </a:lnRef>
+          <a:fillRef idx="1">
+            <a:schemeClr val="accent1"/>
+          </a:fillRef>
+          <a:effectRef idx="0">
+            <a:schemeClr val="accent1"/>
+          </a:effectRef>
+          <a:fontRef idx="minor">
+            <a:schemeClr val="lt1"/>
+          </a:fontRef>
+        </p:style>
+        <p:txBody>
+          <a:bodyPr vert="horz" rtlCol="0" anchor="ctr"/>
+          <a:lstStyle/>
+          <a:p>
+            <a:pPr algn="ctr"/>
+            <a:r>
+              <a:rPr lang="fr-FR" sz="1200" b="1" dirty="0"/>
+              <a:t>ETAT</a:t>
+            </a:r>
+          </a:p>
+        </p:txBody>
+      </p:sp>
+      <p:sp>
+        <p:nvSpPr>
+          <p:cNvPr id="12" name="ZoneTexte 11">
+            <a:extLst>
+              <a:ext uri="{FF2B5EF4-FFF2-40B4-BE49-F238E27FC236}">
+                <a16:creationId xmlns:a16="http://schemas.microsoft.com/office/drawing/2014/main" id="{456F1402-761F-D699-4A1A-81BE4C518AB3}"/>
+              </a:ext>
+            </a:extLst>
+          </p:cNvPr>
+          <p:cNvSpPr txBox="1"/>
+          <p:nvPr/>
+        </p:nvSpPr>
+        <p:spPr>
+          <a:xfrm>
+            <a:off x="808897" y="3506323"/>
+            <a:ext cx="6096000" cy="338554"/>
+          </a:xfrm>
+          <a:prstGeom prst="rect">
+            <a:avLst/>
+          </a:prstGeom>
+          <a:solidFill>
+            <a:schemeClr val="bg1">
+              <a:lumMod val="85000"/>
+            </a:schemeClr>
+          </a:solidFill>
+        </p:spPr>
+        <p:txBody>
+          <a:bodyPr wrap="square">
+            <a:spAutoFit/>
+          </a:bodyPr>
+          <a:lstStyle/>
+          <a:p>
+            <a:r>
+              <a:rPr lang="en-US" sz="1600" dirty="0" err="1">
+                <a:highlight>
+                  <a:srgbClr val="D6B4B2"/>
+                </a:highlight>
+              </a:rPr>
+              <a:t>pointA</a:t>
+            </a:r>
+            <a:r>
+              <a:rPr lang="fr-FR" sz="1600" dirty="0"/>
+              <a:t> </a:t>
+            </a:r>
+            <a:r>
+              <a:rPr lang="fr-FR" sz="1600" b="1" dirty="0"/>
+              <a:t>=</a:t>
+            </a:r>
+            <a:r>
+              <a:rPr lang="fr-FR" sz="1600" dirty="0"/>
+              <a:t> Point(-0.5, 5.5, ‘A’)</a:t>
+            </a:r>
+          </a:p>
+        </p:txBody>
+      </p:sp>
+    </p:spTree>
+    <p:extLst>
+      <p:ext uri="{BB962C8B-B14F-4D97-AF65-F5344CB8AC3E}">
+        <p14:creationId xmlns:p14="http://schemas.microsoft.com/office/powerpoint/2010/main" val="2767806304"/>
+      </p:ext>
+    </p:extLst>
+  </p:cSld>
+  <p:clrMapOvr>
+    <a:masterClrMapping/>
+  </p:clrMapOvr>
+</p:sld>
+</file>
+
+<file path=ppt/slides/slide31.xml><?xml version="1.0" encoding="utf-8"?>
+<p:sld xmlns:a="http://schemas.openxmlformats.org/drawingml/2006/main" xmlns:r="http://schemas.openxmlformats.org/officeDocument/2006/relationships" xmlns:p="http://schemas.openxmlformats.org/presentationml/2006/main">
+  <p:cSld>
+    <p:spTree>
+      <p:nvGrpSpPr>
+        <p:cNvPr id="1" name="">
+          <a:extLst>
+            <a:ext uri="{FF2B5EF4-FFF2-40B4-BE49-F238E27FC236}">
+              <a16:creationId xmlns:a16="http://schemas.microsoft.com/office/drawing/2014/main" id="{8CE50980-3F53-493E-B255-288159095AFF}"/>
+            </a:ext>
+          </a:extLst>
+        </p:cNvPr>
+        <p:cNvGrpSpPr/>
+        <p:nvPr/>
+      </p:nvGrpSpPr>
+      <p:grpSpPr>
+        <a:xfrm>
+          <a:off x="0" y="0"/>
+          <a:ext cx="0" cy="0"/>
+          <a:chOff x="0" y="0"/>
+          <a:chExt cx="0" cy="0"/>
+        </a:xfrm>
+      </p:grpSpPr>
+      <p:sp>
+        <p:nvSpPr>
+          <p:cNvPr id="3" name="Rectangle 2">
+            <a:extLst>
+              <a:ext uri="{FF2B5EF4-FFF2-40B4-BE49-F238E27FC236}">
+                <a16:creationId xmlns:a16="http://schemas.microsoft.com/office/drawing/2014/main" id="{FDEA1EC8-02B6-73F9-A3A6-23F088C48204}"/>
+              </a:ext>
+            </a:extLst>
+          </p:cNvPr>
+          <p:cNvSpPr/>
+          <p:nvPr/>
+        </p:nvSpPr>
+        <p:spPr>
+          <a:xfrm>
+            <a:off x="673975" y="405113"/>
+            <a:ext cx="11020314" cy="937549"/>
+          </a:xfrm>
+          <a:prstGeom prst="rect">
+            <a:avLst/>
+          </a:prstGeom>
+          <a:solidFill>
+            <a:schemeClr val="bg1"/>
+          </a:solidFill>
+          <a:ln>
+            <a:solidFill>
+              <a:schemeClr val="bg1">
+                <a:lumMod val="95000"/>
+              </a:schemeClr>
+            </a:solidFill>
+          </a:ln>
+          <a:effectLst>
+            <a:outerShdw blurRad="50800" dist="38100" dir="2700000" algn="tl" rotWithShape="0">
+              <a:prstClr val="black">
+                <a:alpha val="40000"/>
+              </a:prstClr>
+            </a:outerShdw>
+          </a:effectLst>
+        </p:spPr>
+        <p:style>
+          <a:lnRef idx="2">
+            <a:schemeClr val="accent1">
+              <a:shade val="15000"/>
+            </a:schemeClr>
+          </a:lnRef>
+          <a:fillRef idx="1">
+            <a:schemeClr val="accent1"/>
+          </a:fillRef>
+          <a:effectRef idx="0">
+            <a:schemeClr val="accent1"/>
+          </a:effectRef>
+          <a:fontRef idx="minor">
+            <a:schemeClr val="lt1"/>
+          </a:fontRef>
+        </p:style>
+        <p:txBody>
+          <a:bodyPr rtlCol="0" anchor="ctr"/>
+          <a:lstStyle/>
+          <a:p>
+            <a:pPr algn="ctr"/>
+            <a:endParaRPr lang="fr-FR"/>
+          </a:p>
+        </p:txBody>
+      </p:sp>
+      <p:sp>
+        <p:nvSpPr>
+          <p:cNvPr id="2" name="Titre 1">
+            <a:extLst>
+              <a:ext uri="{FF2B5EF4-FFF2-40B4-BE49-F238E27FC236}">
+                <a16:creationId xmlns:a16="http://schemas.microsoft.com/office/drawing/2014/main" id="{542F0D4E-34BF-956E-F157-ACD4929EE3CD}"/>
+              </a:ext>
+            </a:extLst>
+          </p:cNvPr>
+          <p:cNvSpPr txBox="1">
+            <a:spLocks/>
+          </p:cNvSpPr>
+          <p:nvPr/>
+        </p:nvSpPr>
+        <p:spPr>
+          <a:xfrm>
+            <a:off x="907225" y="583365"/>
+            <a:ext cx="8970548" cy="701426"/>
+          </a:xfrm>
+          <a:prstGeom prst="rect">
+            <a:avLst/>
+          </a:prstGeom>
+        </p:spPr>
+        <p:txBody>
+          <a:bodyPr>
+            <a:normAutofit/>
+          </a:bodyPr>
+          <a:lstStyle>
+            <a:lvl1pPr algn="l" defTabSz="914400" rtl="0" eaLnBrk="1" latinLnBrk="0" hangingPunct="1">
+              <a:lnSpc>
+                <a:spcPct val="90000"/>
+              </a:lnSpc>
+              <a:spcBef>
+                <a:spcPct val="0"/>
+              </a:spcBef>
+              <a:buNone/>
+              <a:defRPr sz="4400" kern="1200">
+                <a:solidFill>
+                  <a:schemeClr val="tx1"/>
+                </a:solidFill>
+                <a:latin typeface="+mj-lt"/>
+                <a:ea typeface="+mj-ea"/>
+                <a:cs typeface="+mj-cs"/>
+              </a:defRPr>
+            </a:lvl1pPr>
+          </a:lstStyle>
+          <a:p>
+            <a:r>
+              <a:rPr lang="fr-FR" sz="4000" dirty="0"/>
+              <a:t>S’entrainer à la POO</a:t>
+            </a:r>
+          </a:p>
+        </p:txBody>
+      </p:sp>
+      <p:sp>
+        <p:nvSpPr>
+          <p:cNvPr id="7" name="Rectangle 6">
+            <a:extLst>
+              <a:ext uri="{FF2B5EF4-FFF2-40B4-BE49-F238E27FC236}">
                 <a16:creationId xmlns:a16="http://schemas.microsoft.com/office/drawing/2014/main" id="{A436A60A-C9A7-5C11-F61F-8965A324E636}"/>
               </a:ext>
             </a:extLst>
@@ -35291,7 +36143,7 @@
 </p:sld>
 </file>
 
-<file path=ppt/slides/slide31.xml><?xml version="1.0" encoding="utf-8"?>
+<file path=ppt/slides/slide32.xml><?xml version="1.0" encoding="utf-8"?>
 <p:sld xmlns:a="http://schemas.openxmlformats.org/drawingml/2006/main" xmlns:r="http://schemas.openxmlformats.org/officeDocument/2006/relationships" xmlns:p="http://schemas.openxmlformats.org/presentationml/2006/main">
   <p:cSld>
     <p:spTree>
@@ -36545,7 +37397,7 @@
 </p:sld>
 </file>
 
-<file path=ppt/slides/slide32.xml><?xml version="1.0" encoding="utf-8"?>
+<file path=ppt/slides/slide33.xml><?xml version="1.0" encoding="utf-8"?>
 <p:sld xmlns:a="http://schemas.openxmlformats.org/drawingml/2006/main" xmlns:r="http://schemas.openxmlformats.org/officeDocument/2006/relationships" xmlns:p="http://schemas.openxmlformats.org/presentationml/2006/main">
   <p:cSld>
     <p:spTree>
@@ -37706,7 +38558,7 @@
 </p:sld>
 </file>
 
-<file path=ppt/slides/slide33.xml><?xml version="1.0" encoding="utf-8"?>
+<file path=ppt/slides/slide34.xml><?xml version="1.0" encoding="utf-8"?>
 <p:sld xmlns:a="http://schemas.openxmlformats.org/drawingml/2006/main" xmlns:r="http://schemas.openxmlformats.org/officeDocument/2006/relationships" xmlns:p="http://schemas.openxmlformats.org/presentationml/2006/main">
   <p:cSld>
     <p:spTree>
@@ -39095,7 +39947,7 @@
 </p:sld>
 </file>
 
-<file path=ppt/slides/slide34.xml><?xml version="1.0" encoding="utf-8"?>
+<file path=ppt/slides/slide35.xml><?xml version="1.0" encoding="utf-8"?>
 <p:sld xmlns:a="http://schemas.openxmlformats.org/drawingml/2006/main" xmlns:r="http://schemas.openxmlformats.org/officeDocument/2006/relationships" xmlns:p="http://schemas.openxmlformats.org/presentationml/2006/main">
   <p:cSld>
     <p:spTree>
@@ -40213,7 +41065,7 @@
 </p:sld>
 </file>
 
-<file path=ppt/slides/slide35.xml><?xml version="1.0" encoding="utf-8"?>
+<file path=ppt/slides/slide36.xml><?xml version="1.0" encoding="utf-8"?>
 <p:sld xmlns:a="http://schemas.openxmlformats.org/drawingml/2006/main" xmlns:r="http://schemas.openxmlformats.org/officeDocument/2006/relationships" xmlns:p="http://schemas.openxmlformats.org/presentationml/2006/main">
   <p:cSld>
     <p:spTree>

</xml_diff>